<commit_message>
progress on the template
</commit_message>
<xml_diff>
--- a/_extensions/presentation-gouv/ressources/template_presentation.pptx
+++ b/_extensions/presentation-gouv/ressources/template_presentation.pptx
@@ -713,7 +713,7 @@
 </file>
 
 <file path=ppt/slideLayouts/slideLayout2.xml><?xml version="1.0" encoding="utf-8"?>
-<p:sldLayout xmlns:a="http://schemas.openxmlformats.org/drawingml/2006/main" xmlns:r="http://schemas.openxmlformats.org/officeDocument/2006/relationships" xmlns:p="http://schemas.openxmlformats.org/presentationml/2006/main" type="obj" preserve="1">
+<p:sldLayout xmlns:a="http://schemas.openxmlformats.org/drawingml/2006/main" xmlns:r="http://schemas.openxmlformats.org/officeDocument/2006/relationships" xmlns:p="http://schemas.openxmlformats.org/presentationml/2006/main" preserve="1" userDrawn="1">
   <p:cSld name="Title and Content">
     <p:spTree>
       <p:nvGrpSpPr>
@@ -864,6 +864,67 @@
               <a:t>‹N°›</a:t>
             </a:fld>
             <a:endParaRPr lang="en-US"/>
+          </a:p>
+        </p:txBody>
+      </p:sp>
+      <p:sp>
+        <p:nvSpPr>
+          <p:cNvPr id="8" name="Espace réservé du texte 7">
+            <a:extLst>
+              <a:ext uri="{FF2B5EF4-FFF2-40B4-BE49-F238E27FC236}">
+                <a16:creationId xmlns:a16="http://schemas.microsoft.com/office/drawing/2014/main" id="{297D3920-63DD-4568-B5A5-5100F43856FF}"/>
+              </a:ext>
+            </a:extLst>
+          </p:cNvPr>
+          <p:cNvSpPr>
+            <a:spLocks noGrp="1"/>
+          </p:cNvSpPr>
+          <p:nvPr>
+            <p:ph type="body" sz="quarter" idx="13"/>
+          </p:nvPr>
+        </p:nvSpPr>
+        <p:spPr>
+          <a:xfrm>
+            <a:off x="324000" y="1249200"/>
+            <a:ext cx="8424000" cy="241200"/>
+          </a:xfrm>
+        </p:spPr>
+        <p:txBody>
+          <a:bodyPr vert="horz" lIns="0" tIns="0" rIns="0" bIns="0" rtlCol="0" anchor="t" anchorCtr="0">
+            <a:noAutofit/>
+          </a:bodyPr>
+          <a:lstStyle>
+            <a:lvl1pPr>
+              <a:defRPr lang="fr-FR" sz="1500" b="1" dirty="0" smtClean="0">
+                <a:solidFill>
+                  <a:schemeClr val="tx1">
+                    <a:lumMod val="50000"/>
+                    <a:lumOff val="50000"/>
+                  </a:schemeClr>
+                </a:solidFill>
+                <a:ea typeface="Marianne" charset="0"/>
+                <a:cs typeface="Marianne" charset="0"/>
+              </a:defRPr>
+            </a:lvl1pPr>
+          </a:lstStyle>
+          <a:p>
+            <a:pPr marL="9525" lvl="0" indent="85725" defTabSz="914400">
+              <a:lnSpc>
+                <a:spcPct val="100000"/>
+              </a:lnSpc>
+              <a:spcBef>
+                <a:spcPts val="400"/>
+              </a:spcBef>
+              <a:spcAft>
+                <a:spcPts val="800"/>
+              </a:spcAft>
+              <a:buFont typeface="+mj-lt"/>
+              <a:tabLst/>
+            </a:pPr>
+            <a:r>
+              <a:rPr lang="fr-FR" dirty="0"/>
+              <a:t>Cliquez pour modifier les styles du texte du masque</a:t>
+            </a:r>
           </a:p>
         </p:txBody>
       </p:sp>
@@ -1158,7 +1219,7 @@
           <a:lstStyle/>
           <a:p>
             <a:r>
-              <a:rPr lang="en-US"/>
+              <a:rPr lang="en-US" dirty="0"/>
               <a:t>Click to edit Master title style</a:t>
             </a:r>
           </a:p>
@@ -1214,35 +1275,35 @@
           <a:p>
             <a:pPr lvl="0"/>
             <a:r>
-              <a:rPr lang="en-US"/>
+              <a:rPr lang="en-US" dirty="0"/>
               <a:t>Click to edit Master text styles</a:t>
             </a:r>
           </a:p>
           <a:p>
             <a:pPr lvl="1"/>
             <a:r>
-              <a:rPr lang="en-US"/>
+              <a:rPr lang="en-US" dirty="0"/>
               <a:t>Second level</a:t>
             </a:r>
           </a:p>
           <a:p>
             <a:pPr lvl="2"/>
             <a:r>
-              <a:rPr lang="en-US"/>
+              <a:rPr lang="en-US" dirty="0"/>
               <a:t>Third level</a:t>
             </a:r>
           </a:p>
           <a:p>
             <a:pPr lvl="3"/>
             <a:r>
-              <a:rPr lang="en-US"/>
+              <a:rPr lang="en-US" dirty="0"/>
               <a:t>Fourth level</a:t>
             </a:r>
           </a:p>
           <a:p>
             <a:pPr lvl="4"/>
             <a:r>
-              <a:rPr lang="en-US"/>
+              <a:rPr lang="en-US" dirty="0"/>
               <a:t>Fifth level</a:t>
             </a:r>
           </a:p>
@@ -2622,7 +2683,7 @@
               <a:tabLst/>
             </a:pPr>
             <a:r>
-              <a:rPr lang="en-US"/>
+              <a:rPr lang="en-US" dirty="0"/>
               <a:t>Click to edit Master title style</a:t>
             </a:r>
           </a:p>
@@ -2815,7 +2876,7 @@
             <a:noAutofit/>
           </a:bodyPr>
           <a:lstStyle>
-            <a:lvl1pPr>
+            <a:lvl1pPr algn="r">
               <a:defRPr lang="en-US" sz="750" b="1" dirty="0">
                 <a:latin typeface="Marianne" charset="0"/>
                 <a:ea typeface="Marianne" charset="0"/>
@@ -2824,7 +2885,7 @@
             </a:lvl1pPr>
           </a:lstStyle>
           <a:p>
-            <a:pPr algn="r" defTabSz="914400"/>
+            <a:pPr defTabSz="914400"/>
             <a:endParaRPr lang="fr-FR"/>
           </a:p>
         </p:txBody>
@@ -2853,15 +2914,15 @@
             <a:noAutofit/>
           </a:bodyPr>
           <a:lstStyle>
-            <a:lvl1pPr>
+            <a:lvl1pPr algn="r">
               <a:defRPr lang="en-US" sz="750" b="1" smtClean="0"/>
             </a:lvl1pPr>
           </a:lstStyle>
           <a:p>
-            <a:pPr algn="r" defTabSz="914400"/>
+            <a:pPr defTabSz="914400"/>
             <a:fld id="{C5EF2332-01BF-834F-8236-50238282D533}" type="slidenum">
               <a:rPr lang="fr-FR" smtClean="0"/>
-              <a:pPr algn="r" defTabSz="914400"/>
+              <a:pPr defTabSz="914400"/>
               <a:t>‹N°›</a:t>
             </a:fld>
             <a:endParaRPr lang="fr-FR"/>
@@ -3091,7 +3152,7 @@
   </p:sldLayoutIdLst>
   <p:txStyles>
     <p:titleStyle>
-      <a:lvl1pPr algn="ctr" defTabSz="342900" rtl="0" eaLnBrk="1" latinLnBrk="0" hangingPunct="1">
+      <a:lvl1pPr algn="l" defTabSz="342900" rtl="0" eaLnBrk="1" latinLnBrk="0" hangingPunct="1">
         <a:spcBef>
           <a:spcPct val="0"/>
         </a:spcBef>

</xml_diff>

<commit_message>
further changes on the template
</commit_message>
<xml_diff>
--- a/_extensions/presentation-gouv/ressources/template_presentation.pptx
+++ b/_extensions/presentation-gouv/ressources/template_presentation.pptx
@@ -4,6 +4,9 @@
   <p:sldMasterIdLst>
     <p:sldMasterId id="2147483648" r:id="rId1"/>
   </p:sldMasterIdLst>
+  <p:notesMasterIdLst>
+    <p:notesMasterId r:id="rId6"/>
+  </p:notesMasterIdLst>
   <p:sldIdLst>
     <p:sldId id="256" r:id="rId2"/>
     <p:sldId id="257" r:id="rId3"/>
@@ -126,8 +129,357 @@
 </p:presentation>
 </file>
 
+<file path=ppt/notesMasters/notesMaster1.xml><?xml version="1.0" encoding="utf-8"?>
+<p:notesMaster xmlns:a="http://schemas.openxmlformats.org/drawingml/2006/main" xmlns:r="http://schemas.openxmlformats.org/officeDocument/2006/relationships" xmlns:p="http://schemas.openxmlformats.org/presentationml/2006/main">
+  <p:cSld>
+    <p:bg>
+      <p:bgRef idx="1001">
+        <a:schemeClr val="bg1"/>
+      </p:bgRef>
+    </p:bg>
+    <p:spTree>
+      <p:nvGrpSpPr>
+        <p:cNvPr id="1" name=""/>
+        <p:cNvGrpSpPr/>
+        <p:nvPr/>
+      </p:nvGrpSpPr>
+      <p:grpSpPr>
+        <a:xfrm>
+          <a:off x="0" y="0"/>
+          <a:ext cx="0" cy="0"/>
+          <a:chOff x="0" y="0"/>
+          <a:chExt cx="0" cy="0"/>
+        </a:xfrm>
+      </p:grpSpPr>
+      <p:sp>
+        <p:nvSpPr>
+          <p:cNvPr id="2" name="Espace réservé de l'en-tête 1"/>
+          <p:cNvSpPr>
+            <a:spLocks noGrp="1"/>
+          </p:cNvSpPr>
+          <p:nvPr>
+            <p:ph type="hdr" sz="quarter"/>
+          </p:nvPr>
+        </p:nvSpPr>
+        <p:spPr>
+          <a:xfrm>
+            <a:off x="0" y="0"/>
+            <a:ext cx="2971800" cy="458788"/>
+          </a:xfrm>
+          <a:prstGeom prst="rect">
+            <a:avLst/>
+          </a:prstGeom>
+        </p:spPr>
+        <p:txBody>
+          <a:bodyPr vert="horz" lIns="91440" tIns="45720" rIns="91440" bIns="45720" rtlCol="0"/>
+          <a:lstStyle>
+            <a:lvl1pPr algn="l">
+              <a:defRPr sz="1200"/>
+            </a:lvl1pPr>
+          </a:lstStyle>
+          <a:p>
+            <a:endParaRPr lang="fr-FR"/>
+          </a:p>
+        </p:txBody>
+      </p:sp>
+      <p:sp>
+        <p:nvSpPr>
+          <p:cNvPr id="3" name="Espace réservé de la date 2"/>
+          <p:cNvSpPr>
+            <a:spLocks noGrp="1"/>
+          </p:cNvSpPr>
+          <p:nvPr>
+            <p:ph type="dt" idx="1"/>
+          </p:nvPr>
+        </p:nvSpPr>
+        <p:spPr>
+          <a:xfrm>
+            <a:off x="3884613" y="0"/>
+            <a:ext cx="2971800" cy="458788"/>
+          </a:xfrm>
+          <a:prstGeom prst="rect">
+            <a:avLst/>
+          </a:prstGeom>
+        </p:spPr>
+        <p:txBody>
+          <a:bodyPr vert="horz" lIns="91440" tIns="45720" rIns="91440" bIns="45720" rtlCol="0"/>
+          <a:lstStyle>
+            <a:lvl1pPr algn="r">
+              <a:defRPr sz="1200"/>
+            </a:lvl1pPr>
+          </a:lstStyle>
+          <a:p>
+            <a:fld id="{A3236CC0-83F8-EF4B-A59B-004240AF47BA}" type="datetimeFigureOut">
+              <a:rPr lang="fr-FR" smtClean="0"/>
+              <a:t>03/11/2022</a:t>
+            </a:fld>
+            <a:endParaRPr lang="fr-FR"/>
+          </a:p>
+        </p:txBody>
+      </p:sp>
+      <p:sp>
+        <p:nvSpPr>
+          <p:cNvPr id="4" name="Espace réservé de l'image des diapositives 3"/>
+          <p:cNvSpPr>
+            <a:spLocks noGrp="1" noRot="1" noChangeAspect="1"/>
+          </p:cNvSpPr>
+          <p:nvPr>
+            <p:ph type="sldImg" idx="2"/>
+          </p:nvPr>
+        </p:nvSpPr>
+        <p:spPr>
+          <a:xfrm>
+            <a:off x="685800" y="1143000"/>
+            <a:ext cx="5486400" cy="3086100"/>
+          </a:xfrm>
+          <a:prstGeom prst="rect">
+            <a:avLst/>
+          </a:prstGeom>
+          <a:noFill/>
+          <a:ln w="12700">
+            <a:solidFill>
+              <a:prstClr val="black"/>
+            </a:solidFill>
+          </a:ln>
+        </p:spPr>
+        <p:txBody>
+          <a:bodyPr vert="horz" lIns="91440" tIns="45720" rIns="91440" bIns="45720" rtlCol="0" anchor="ctr"/>
+          <a:lstStyle/>
+          <a:p>
+            <a:endParaRPr lang="fr-FR"/>
+          </a:p>
+        </p:txBody>
+      </p:sp>
+      <p:sp>
+        <p:nvSpPr>
+          <p:cNvPr id="5" name="Espace réservé des notes 4"/>
+          <p:cNvSpPr>
+            <a:spLocks noGrp="1"/>
+          </p:cNvSpPr>
+          <p:nvPr>
+            <p:ph type="body" sz="quarter" idx="3"/>
+          </p:nvPr>
+        </p:nvSpPr>
+        <p:spPr>
+          <a:xfrm>
+            <a:off x="685800" y="4400550"/>
+            <a:ext cx="5486400" cy="3600450"/>
+          </a:xfrm>
+          <a:prstGeom prst="rect">
+            <a:avLst/>
+          </a:prstGeom>
+        </p:spPr>
+        <p:txBody>
+          <a:bodyPr vert="horz" lIns="91440" tIns="45720" rIns="91440" bIns="45720" rtlCol="0"/>
+          <a:lstStyle/>
+          <a:p>
+            <a:pPr lvl="0"/>
+            <a:r>
+              <a:rPr lang="fr-FR"/>
+              <a:t>Cliquez pour modifier les styles du texte du masque</a:t>
+            </a:r>
+          </a:p>
+          <a:p>
+            <a:pPr lvl="1"/>
+            <a:r>
+              <a:rPr lang="fr-FR"/>
+              <a:t>Deuxième niveau</a:t>
+            </a:r>
+          </a:p>
+          <a:p>
+            <a:pPr lvl="2"/>
+            <a:r>
+              <a:rPr lang="fr-FR"/>
+              <a:t>Troisième niveau</a:t>
+            </a:r>
+          </a:p>
+          <a:p>
+            <a:pPr lvl="3"/>
+            <a:r>
+              <a:rPr lang="fr-FR"/>
+              <a:t>Quatrième niveau</a:t>
+            </a:r>
+          </a:p>
+          <a:p>
+            <a:pPr lvl="4"/>
+            <a:r>
+              <a:rPr lang="fr-FR"/>
+              <a:t>Cinquième niveau</a:t>
+            </a:r>
+          </a:p>
+        </p:txBody>
+      </p:sp>
+      <p:sp>
+        <p:nvSpPr>
+          <p:cNvPr id="6" name="Espace réservé du pied de page 5"/>
+          <p:cNvSpPr>
+            <a:spLocks noGrp="1"/>
+          </p:cNvSpPr>
+          <p:nvPr>
+            <p:ph type="ftr" sz="quarter" idx="4"/>
+          </p:nvPr>
+        </p:nvSpPr>
+        <p:spPr>
+          <a:xfrm>
+            <a:off x="0" y="8685213"/>
+            <a:ext cx="2971800" cy="458787"/>
+          </a:xfrm>
+          <a:prstGeom prst="rect">
+            <a:avLst/>
+          </a:prstGeom>
+        </p:spPr>
+        <p:txBody>
+          <a:bodyPr vert="horz" lIns="91440" tIns="45720" rIns="91440" bIns="45720" rtlCol="0" anchor="b"/>
+          <a:lstStyle>
+            <a:lvl1pPr algn="l">
+              <a:defRPr sz="1200"/>
+            </a:lvl1pPr>
+          </a:lstStyle>
+          <a:p>
+            <a:endParaRPr lang="fr-FR"/>
+          </a:p>
+        </p:txBody>
+      </p:sp>
+      <p:sp>
+        <p:nvSpPr>
+          <p:cNvPr id="7" name="Espace réservé du numéro de diapositive 6"/>
+          <p:cNvSpPr>
+            <a:spLocks noGrp="1"/>
+          </p:cNvSpPr>
+          <p:nvPr>
+            <p:ph type="sldNum" sz="quarter" idx="5"/>
+          </p:nvPr>
+        </p:nvSpPr>
+        <p:spPr>
+          <a:xfrm>
+            <a:off x="3884613" y="8685213"/>
+            <a:ext cx="2971800" cy="458787"/>
+          </a:xfrm>
+          <a:prstGeom prst="rect">
+            <a:avLst/>
+          </a:prstGeom>
+        </p:spPr>
+        <p:txBody>
+          <a:bodyPr vert="horz" lIns="91440" tIns="45720" rIns="91440" bIns="45720" rtlCol="0" anchor="b"/>
+          <a:lstStyle>
+            <a:lvl1pPr algn="r">
+              <a:defRPr sz="1200"/>
+            </a:lvl1pPr>
+          </a:lstStyle>
+          <a:p>
+            <a:fld id="{C3CC2C7D-3FF7-7D49-A0C1-95B980601216}" type="slidenum">
+              <a:rPr lang="fr-FR" smtClean="0"/>
+              <a:t>‹N°›</a:t>
+            </a:fld>
+            <a:endParaRPr lang="fr-FR"/>
+          </a:p>
+        </p:txBody>
+      </p:sp>
+    </p:spTree>
+    <p:extLst>
+      <p:ext uri="{BB962C8B-B14F-4D97-AF65-F5344CB8AC3E}">
+        <p14:creationId xmlns:p14="http://schemas.microsoft.com/office/powerpoint/2010/main" val="3528493257"/>
+      </p:ext>
+    </p:extLst>
+  </p:cSld>
+  <p:clrMap bg1="lt1" tx1="dk1" bg2="lt2" tx2="dk2" accent1="accent1" accent2="accent2" accent3="accent3" accent4="accent4" accent5="accent5" accent6="accent6" hlink="hlink" folHlink="folHlink"/>
+  <p:notesStyle>
+    <a:lvl1pPr marL="0" algn="l" defTabSz="914400" rtl="0" eaLnBrk="1" latinLnBrk="0" hangingPunct="1">
+      <a:defRPr sz="1200" kern="1200">
+        <a:solidFill>
+          <a:schemeClr val="tx1"/>
+        </a:solidFill>
+        <a:latin typeface="+mn-lt"/>
+        <a:ea typeface="+mn-ea"/>
+        <a:cs typeface="+mn-cs"/>
+      </a:defRPr>
+    </a:lvl1pPr>
+    <a:lvl2pPr marL="457200" algn="l" defTabSz="914400" rtl="0" eaLnBrk="1" latinLnBrk="0" hangingPunct="1">
+      <a:defRPr sz="1200" kern="1200">
+        <a:solidFill>
+          <a:schemeClr val="tx1"/>
+        </a:solidFill>
+        <a:latin typeface="+mn-lt"/>
+        <a:ea typeface="+mn-ea"/>
+        <a:cs typeface="+mn-cs"/>
+      </a:defRPr>
+    </a:lvl2pPr>
+    <a:lvl3pPr marL="914400" algn="l" defTabSz="914400" rtl="0" eaLnBrk="1" latinLnBrk="0" hangingPunct="1">
+      <a:defRPr sz="1200" kern="1200">
+        <a:solidFill>
+          <a:schemeClr val="tx1"/>
+        </a:solidFill>
+        <a:latin typeface="+mn-lt"/>
+        <a:ea typeface="+mn-ea"/>
+        <a:cs typeface="+mn-cs"/>
+      </a:defRPr>
+    </a:lvl3pPr>
+    <a:lvl4pPr marL="1371600" algn="l" defTabSz="914400" rtl="0" eaLnBrk="1" latinLnBrk="0" hangingPunct="1">
+      <a:defRPr sz="1200" kern="1200">
+        <a:solidFill>
+          <a:schemeClr val="tx1"/>
+        </a:solidFill>
+        <a:latin typeface="+mn-lt"/>
+        <a:ea typeface="+mn-ea"/>
+        <a:cs typeface="+mn-cs"/>
+      </a:defRPr>
+    </a:lvl4pPr>
+    <a:lvl5pPr marL="1828800" algn="l" defTabSz="914400" rtl="0" eaLnBrk="1" latinLnBrk="0" hangingPunct="1">
+      <a:defRPr sz="1200" kern="1200">
+        <a:solidFill>
+          <a:schemeClr val="tx1"/>
+        </a:solidFill>
+        <a:latin typeface="+mn-lt"/>
+        <a:ea typeface="+mn-ea"/>
+        <a:cs typeface="+mn-cs"/>
+      </a:defRPr>
+    </a:lvl5pPr>
+    <a:lvl6pPr marL="2286000" algn="l" defTabSz="914400" rtl="0" eaLnBrk="1" latinLnBrk="0" hangingPunct="1">
+      <a:defRPr sz="1200" kern="1200">
+        <a:solidFill>
+          <a:schemeClr val="tx1"/>
+        </a:solidFill>
+        <a:latin typeface="+mn-lt"/>
+        <a:ea typeface="+mn-ea"/>
+        <a:cs typeface="+mn-cs"/>
+      </a:defRPr>
+    </a:lvl6pPr>
+    <a:lvl7pPr marL="2743200" algn="l" defTabSz="914400" rtl="0" eaLnBrk="1" latinLnBrk="0" hangingPunct="1">
+      <a:defRPr sz="1200" kern="1200">
+        <a:solidFill>
+          <a:schemeClr val="tx1"/>
+        </a:solidFill>
+        <a:latin typeface="+mn-lt"/>
+        <a:ea typeface="+mn-ea"/>
+        <a:cs typeface="+mn-cs"/>
+      </a:defRPr>
+    </a:lvl7pPr>
+    <a:lvl8pPr marL="3200400" algn="l" defTabSz="914400" rtl="0" eaLnBrk="1" latinLnBrk="0" hangingPunct="1">
+      <a:defRPr sz="1200" kern="1200">
+        <a:solidFill>
+          <a:schemeClr val="tx1"/>
+        </a:solidFill>
+        <a:latin typeface="+mn-lt"/>
+        <a:ea typeface="+mn-ea"/>
+        <a:cs typeface="+mn-cs"/>
+      </a:defRPr>
+    </a:lvl8pPr>
+    <a:lvl9pPr marL="3657600" algn="l" defTabSz="914400" rtl="0" eaLnBrk="1" latinLnBrk="0" hangingPunct="1">
+      <a:defRPr sz="1200" kern="1200">
+        <a:solidFill>
+          <a:schemeClr val="tx1"/>
+        </a:solidFill>
+        <a:latin typeface="+mn-lt"/>
+        <a:ea typeface="+mn-ea"/>
+        <a:cs typeface="+mn-cs"/>
+      </a:defRPr>
+    </a:lvl9pPr>
+  </p:notesStyle>
+</p:notesMaster>
+</file>
+
 <file path=ppt/slideLayouts/slideLayout1.xml><?xml version="1.0" encoding="utf-8"?>
-<p:sldLayout xmlns:a="http://schemas.openxmlformats.org/drawingml/2006/main" xmlns:r="http://schemas.openxmlformats.org/officeDocument/2006/relationships" xmlns:p="http://schemas.openxmlformats.org/presentationml/2006/main" type="title" preserve="1">
+<p:sldLayout xmlns:a="http://schemas.openxmlformats.org/drawingml/2006/main" xmlns:r="http://schemas.openxmlformats.org/officeDocument/2006/relationships" xmlns:p="http://schemas.openxmlformats.org/presentationml/2006/main" preserve="1" userDrawn="1">
   <p:cSld name="Title Slide">
     <p:spTree>
       <p:nvGrpSpPr>
@@ -155,16 +507,24 @@
         </p:nvSpPr>
         <p:spPr>
           <a:xfrm>
-            <a:off x="685800" y="1597819"/>
-            <a:ext cx="7772400" cy="1102519"/>
+            <a:off x="2412000" y="2138400"/>
+            <a:ext cx="5832000" cy="583200"/>
           </a:xfrm>
         </p:spPr>
         <p:txBody>
           <a:bodyPr/>
-          <a:lstStyle/>
-          <a:p>
-            <a:r>
-              <a:rPr lang="en-US"/>
+          <a:lstStyle>
+            <a:lvl1pPr>
+              <a:defRPr sz="3200">
+                <a:solidFill>
+                  <a:schemeClr val="tx1"/>
+                </a:solidFill>
+              </a:defRPr>
+            </a:lvl1pPr>
+          </a:lstStyle>
+          <a:p>
+            <a:r>
+              <a:rPr lang="en-US" dirty="0"/>
               <a:t>Click to edit Master title style</a:t>
             </a:r>
           </a:p>
@@ -172,24 +532,132 @@
       </p:sp>
       <p:sp>
         <p:nvSpPr>
-          <p:cNvPr id="3" name="Subtitle 2"/>
-          <p:cNvSpPr>
-            <a:spLocks noGrp="1"/>
-          </p:cNvSpPr>
-          <p:nvPr>
-            <p:ph type="subTitle" idx="1"/>
+          <p:cNvPr id="4" name="Date Placeholder 3"/>
+          <p:cNvSpPr>
+            <a:spLocks noGrp="1"/>
+          </p:cNvSpPr>
+          <p:nvPr>
+            <p:ph type="dt" sz="half" idx="10"/>
           </p:nvPr>
         </p:nvSpPr>
         <p:spPr>
           <a:xfrm>
-            <a:off x="1371600" y="2914650"/>
-            <a:ext cx="6400800" cy="1314450"/>
+            <a:off x="324000" y="4370400"/>
+            <a:ext cx="1440000" cy="270000"/>
           </a:xfrm>
         </p:spPr>
         <p:txBody>
           <a:bodyPr/>
           <a:lstStyle>
-            <a:lvl1pPr marL="0" indent="0" algn="ctr">
+            <a:lvl1pPr>
+              <a:defRPr sz="900"/>
+            </a:lvl1pPr>
+          </a:lstStyle>
+          <a:p>
+            <a:r>
+              <a:rPr lang="fr-FR"/>
+              <a:t>03/11/2022</a:t>
+            </a:r>
+          </a:p>
+        </p:txBody>
+      </p:sp>
+      <p:sp>
+        <p:nvSpPr>
+          <p:cNvPr id="5" name="Footer Placeholder 4"/>
+          <p:cNvSpPr>
+            <a:spLocks noGrp="1"/>
+          </p:cNvSpPr>
+          <p:nvPr>
+            <p:ph type="ftr" sz="quarter" idx="11"/>
+          </p:nvPr>
+        </p:nvSpPr>
+        <p:spPr>
+          <a:xfrm>
+            <a:off x="324000" y="3722400"/>
+            <a:ext cx="2376000" cy="446400"/>
+          </a:xfrm>
+        </p:spPr>
+        <p:txBody>
+          <a:bodyPr/>
+          <a:lstStyle>
+            <a:lvl1pPr algn="l">
+              <a:defRPr lang="en-US" sz="1150" b="1" kern="1200">
+                <a:solidFill>
+                  <a:srgbClr val="21215A"/>
+                </a:solidFill>
+                <a:latin typeface="Marianne" charset="0"/>
+                <a:ea typeface="Marianne" charset="0"/>
+                <a:cs typeface="Marianne" charset="0"/>
+              </a:defRPr>
+            </a:lvl1pPr>
+          </a:lstStyle>
+          <a:p>
+            <a:endParaRPr lang="fr-FR" dirty="0"/>
+          </a:p>
+        </p:txBody>
+      </p:sp>
+      <p:pic>
+        <p:nvPicPr>
+          <p:cNvPr id="7" name="Image 6">
+            <a:extLst>
+              <a:ext uri="{FF2B5EF4-FFF2-40B4-BE49-F238E27FC236}">
+                <a16:creationId xmlns:a16="http://schemas.microsoft.com/office/drawing/2014/main" id="{9B08E1EA-9A26-64D8-7B78-1184FBA2395F}"/>
+              </a:ext>
+            </a:extLst>
+          </p:cNvPr>
+          <p:cNvPicPr>
+            <a:picLocks noChangeAspect="1"/>
+          </p:cNvPicPr>
+          <p:nvPr userDrawn="1"/>
+        </p:nvPicPr>
+        <p:blipFill>
+          <a:blip r:embed="rId2">
+            <a:extLst>
+              <a:ext uri="{28A0092B-C50C-407E-A947-70E740481C1C}">
+                <a14:useLocalDpi xmlns:a14="http://schemas.microsoft.com/office/drawing/2010/main" val="0"/>
+              </a:ext>
+            </a:extLst>
+          </a:blip>
+          <a:stretch>
+            <a:fillRect/>
+          </a:stretch>
+        </p:blipFill>
+        <p:spPr bwMode="gray">
+          <a:xfrm>
+            <a:off x="180680" y="172519"/>
+            <a:ext cx="2289224" cy="1475681"/>
+          </a:xfrm>
+          <a:prstGeom prst="rect">
+            <a:avLst/>
+          </a:prstGeom>
+        </p:spPr>
+      </p:pic>
+      <p:sp>
+        <p:nvSpPr>
+          <p:cNvPr id="3" name="Subtitle 2">
+            <a:extLst>
+              <a:ext uri="{FF2B5EF4-FFF2-40B4-BE49-F238E27FC236}">
+                <a16:creationId xmlns:a16="http://schemas.microsoft.com/office/drawing/2014/main" id="{E862116D-896F-5BE0-B8FD-3049D74360FF}"/>
+              </a:ext>
+            </a:extLst>
+          </p:cNvPr>
+          <p:cNvSpPr>
+            <a:spLocks noGrp="1"/>
+          </p:cNvSpPr>
+          <p:nvPr>
+            <p:ph type="subTitle" idx="1"/>
+          </p:nvPr>
+        </p:nvSpPr>
+        <p:spPr>
+          <a:xfrm>
+            <a:off x="2411876" y="2721600"/>
+            <a:ext cx="5832000" cy="446400"/>
+          </a:xfrm>
+        </p:spPr>
+        <p:txBody>
+          <a:bodyPr/>
+          <a:lstStyle>
+            <a:lvl1pPr marL="0" indent="0" algn="l">
               <a:buNone/>
               <a:defRPr>
                 <a:solidFill>
@@ -288,75 +756,10 @@
           </a:p>
         </p:txBody>
       </p:sp>
-      <p:sp>
-        <p:nvSpPr>
-          <p:cNvPr id="4" name="Date Placeholder 3"/>
-          <p:cNvSpPr>
-            <a:spLocks noGrp="1"/>
-          </p:cNvSpPr>
-          <p:nvPr>
-            <p:ph type="dt" sz="half" idx="10"/>
-          </p:nvPr>
-        </p:nvSpPr>
-        <p:spPr/>
-        <p:txBody>
-          <a:bodyPr/>
-          <a:lstStyle/>
-          <a:p>
-            <a:fld id="{241EB5C9-1307-BA42-ABA2-0BC069CD8E7F}" type="datetimeFigureOut">
-              <a:rPr lang="en-US" smtClean="0"/>
-              <a:t>10/27/22</a:t>
-            </a:fld>
-            <a:endParaRPr lang="en-US"/>
-          </a:p>
-        </p:txBody>
-      </p:sp>
-      <p:sp>
-        <p:nvSpPr>
-          <p:cNvPr id="5" name="Footer Placeholder 4"/>
-          <p:cNvSpPr>
-            <a:spLocks noGrp="1"/>
-          </p:cNvSpPr>
-          <p:nvPr>
-            <p:ph type="ftr" sz="quarter" idx="11"/>
-          </p:nvPr>
-        </p:nvSpPr>
-        <p:spPr/>
-        <p:txBody>
-          <a:bodyPr/>
-          <a:lstStyle/>
-          <a:p>
-            <a:endParaRPr lang="en-US"/>
-          </a:p>
-        </p:txBody>
-      </p:sp>
-      <p:sp>
-        <p:nvSpPr>
-          <p:cNvPr id="6" name="Slide Number Placeholder 5"/>
-          <p:cNvSpPr>
-            <a:spLocks noGrp="1"/>
-          </p:cNvSpPr>
-          <p:nvPr>
-            <p:ph type="sldNum" sz="quarter" idx="12"/>
-          </p:nvPr>
-        </p:nvSpPr>
-        <p:spPr/>
-        <p:txBody>
-          <a:bodyPr/>
-          <a:lstStyle/>
-          <a:p>
-            <a:fld id="{C5EF2332-01BF-834F-8236-50238282D533}" type="slidenum">
-              <a:rPr lang="en-US" smtClean="0"/>
-              <a:t>‹N°›</a:t>
-            </a:fld>
-            <a:endParaRPr lang="en-US"/>
-          </a:p>
-        </p:txBody>
-      </p:sp>
     </p:spTree>
     <p:extLst>
       <p:ext uri="{BB962C8B-B14F-4D97-AF65-F5344CB8AC3E}">
-        <p14:creationId xmlns:p14="http://schemas.microsoft.com/office/powerpoint/2010/main" val="1444357513"/>
+        <p14:creationId xmlns:p14="http://schemas.microsoft.com/office/powerpoint/2010/main" val="2984646347"/>
       </p:ext>
     </p:extLst>
   </p:cSld>
@@ -367,6 +770,533 @@
 </file>
 
 <file path=ppt/slideLayouts/slideLayout10.xml><?xml version="1.0" encoding="utf-8"?>
+<p:sldLayout xmlns:a="http://schemas.openxmlformats.org/drawingml/2006/main" xmlns:r="http://schemas.openxmlformats.org/officeDocument/2006/relationships" xmlns:p="http://schemas.openxmlformats.org/presentationml/2006/main" type="objTx" preserve="1">
+  <p:cSld name="Content with Caption">
+    <p:spTree>
+      <p:nvGrpSpPr>
+        <p:cNvPr id="1" name=""/>
+        <p:cNvGrpSpPr/>
+        <p:nvPr/>
+      </p:nvGrpSpPr>
+      <p:grpSpPr>
+        <a:xfrm>
+          <a:off x="0" y="0"/>
+          <a:ext cx="0" cy="0"/>
+          <a:chOff x="0" y="0"/>
+          <a:chExt cx="0" cy="0"/>
+        </a:xfrm>
+      </p:grpSpPr>
+      <p:sp>
+        <p:nvSpPr>
+          <p:cNvPr id="2" name="Title 1"/>
+          <p:cNvSpPr>
+            <a:spLocks noGrp="1"/>
+          </p:cNvSpPr>
+          <p:nvPr>
+            <p:ph type="title"/>
+          </p:nvPr>
+        </p:nvSpPr>
+        <p:spPr>
+          <a:xfrm>
+            <a:off x="457201" y="204787"/>
+            <a:ext cx="3008313" cy="871538"/>
+          </a:xfrm>
+        </p:spPr>
+        <p:txBody>
+          <a:bodyPr anchor="b"/>
+          <a:lstStyle>
+            <a:lvl1pPr algn="l">
+              <a:defRPr sz="1500" b="1"/>
+            </a:lvl1pPr>
+          </a:lstStyle>
+          <a:p>
+            <a:r>
+              <a:rPr lang="en-US"/>
+              <a:t>Click to edit Master title style</a:t>
+            </a:r>
+          </a:p>
+        </p:txBody>
+      </p:sp>
+      <p:sp>
+        <p:nvSpPr>
+          <p:cNvPr id="3" name="Content Placeholder 2"/>
+          <p:cNvSpPr>
+            <a:spLocks noGrp="1"/>
+          </p:cNvSpPr>
+          <p:nvPr>
+            <p:ph idx="1"/>
+          </p:nvPr>
+        </p:nvSpPr>
+        <p:spPr>
+          <a:xfrm>
+            <a:off x="3575050" y="204788"/>
+            <a:ext cx="5111750" cy="4389835"/>
+          </a:xfrm>
+        </p:spPr>
+        <p:txBody>
+          <a:bodyPr/>
+          <a:lstStyle>
+            <a:lvl1pPr>
+              <a:defRPr sz="2400"/>
+            </a:lvl1pPr>
+            <a:lvl2pPr>
+              <a:defRPr sz="2100"/>
+            </a:lvl2pPr>
+            <a:lvl3pPr>
+              <a:defRPr sz="1800"/>
+            </a:lvl3pPr>
+            <a:lvl4pPr>
+              <a:defRPr sz="1500"/>
+            </a:lvl4pPr>
+            <a:lvl5pPr>
+              <a:defRPr sz="1500"/>
+            </a:lvl5pPr>
+            <a:lvl6pPr>
+              <a:defRPr sz="1500"/>
+            </a:lvl6pPr>
+            <a:lvl7pPr>
+              <a:defRPr sz="1500"/>
+            </a:lvl7pPr>
+            <a:lvl8pPr>
+              <a:defRPr sz="1500"/>
+            </a:lvl8pPr>
+            <a:lvl9pPr>
+              <a:defRPr sz="1500"/>
+            </a:lvl9pPr>
+          </a:lstStyle>
+          <a:p>
+            <a:pPr lvl="0"/>
+            <a:r>
+              <a:rPr lang="en-US"/>
+              <a:t>Click to edit Master text styles</a:t>
+            </a:r>
+          </a:p>
+          <a:p>
+            <a:pPr lvl="1"/>
+            <a:r>
+              <a:rPr lang="en-US"/>
+              <a:t>Second level</a:t>
+            </a:r>
+          </a:p>
+          <a:p>
+            <a:pPr lvl="2"/>
+            <a:r>
+              <a:rPr lang="en-US"/>
+              <a:t>Third level</a:t>
+            </a:r>
+          </a:p>
+          <a:p>
+            <a:pPr lvl="3"/>
+            <a:r>
+              <a:rPr lang="en-US"/>
+              <a:t>Fourth level</a:t>
+            </a:r>
+          </a:p>
+          <a:p>
+            <a:pPr lvl="4"/>
+            <a:r>
+              <a:rPr lang="en-US"/>
+              <a:t>Fifth level</a:t>
+            </a:r>
+          </a:p>
+        </p:txBody>
+      </p:sp>
+      <p:sp>
+        <p:nvSpPr>
+          <p:cNvPr id="4" name="Text Placeholder 3"/>
+          <p:cNvSpPr>
+            <a:spLocks noGrp="1"/>
+          </p:cNvSpPr>
+          <p:nvPr>
+            <p:ph type="body" sz="half" idx="2"/>
+          </p:nvPr>
+        </p:nvSpPr>
+        <p:spPr>
+          <a:xfrm>
+            <a:off x="457201" y="1076326"/>
+            <a:ext cx="3008313" cy="3518297"/>
+          </a:xfrm>
+        </p:spPr>
+        <p:txBody>
+          <a:bodyPr/>
+          <a:lstStyle>
+            <a:lvl1pPr marL="0" indent="0">
+              <a:buNone/>
+              <a:defRPr sz="1050"/>
+            </a:lvl1pPr>
+            <a:lvl2pPr marL="342900" indent="0">
+              <a:buNone/>
+              <a:defRPr sz="900"/>
+            </a:lvl2pPr>
+            <a:lvl3pPr marL="685800" indent="0">
+              <a:buNone/>
+              <a:defRPr sz="750"/>
+            </a:lvl3pPr>
+            <a:lvl4pPr marL="1028700" indent="0">
+              <a:buNone/>
+              <a:defRPr sz="675"/>
+            </a:lvl4pPr>
+            <a:lvl5pPr marL="1371600" indent="0">
+              <a:buNone/>
+              <a:defRPr sz="675"/>
+            </a:lvl5pPr>
+            <a:lvl6pPr marL="1714500" indent="0">
+              <a:buNone/>
+              <a:defRPr sz="675"/>
+            </a:lvl6pPr>
+            <a:lvl7pPr marL="2057400" indent="0">
+              <a:buNone/>
+              <a:defRPr sz="675"/>
+            </a:lvl7pPr>
+            <a:lvl8pPr marL="2400300" indent="0">
+              <a:buNone/>
+              <a:defRPr sz="675"/>
+            </a:lvl8pPr>
+            <a:lvl9pPr marL="2743200" indent="0">
+              <a:buNone/>
+              <a:defRPr sz="675"/>
+            </a:lvl9pPr>
+          </a:lstStyle>
+          <a:p>
+            <a:pPr lvl="0"/>
+            <a:r>
+              <a:rPr lang="en-US"/>
+              <a:t>Click to edit Master text styles</a:t>
+            </a:r>
+          </a:p>
+        </p:txBody>
+      </p:sp>
+      <p:sp>
+        <p:nvSpPr>
+          <p:cNvPr id="5" name="Date Placeholder 4"/>
+          <p:cNvSpPr>
+            <a:spLocks noGrp="1"/>
+          </p:cNvSpPr>
+          <p:nvPr>
+            <p:ph type="dt" sz="half" idx="10"/>
+          </p:nvPr>
+        </p:nvSpPr>
+        <p:spPr/>
+        <p:txBody>
+          <a:bodyPr/>
+          <a:lstStyle/>
+          <a:p>
+            <a:r>
+              <a:rPr lang="fr-FR"/>
+              <a:t>03/11/2022</a:t>
+            </a:r>
+            <a:endParaRPr lang="en-US"/>
+          </a:p>
+        </p:txBody>
+      </p:sp>
+      <p:sp>
+        <p:nvSpPr>
+          <p:cNvPr id="6" name="Footer Placeholder 5"/>
+          <p:cNvSpPr>
+            <a:spLocks noGrp="1"/>
+          </p:cNvSpPr>
+          <p:nvPr>
+            <p:ph type="ftr" sz="quarter" idx="11"/>
+          </p:nvPr>
+        </p:nvSpPr>
+        <p:spPr/>
+        <p:txBody>
+          <a:bodyPr/>
+          <a:lstStyle/>
+          <a:p>
+            <a:endParaRPr lang="en-US"/>
+          </a:p>
+        </p:txBody>
+      </p:sp>
+      <p:sp>
+        <p:nvSpPr>
+          <p:cNvPr id="7" name="Slide Number Placeholder 6"/>
+          <p:cNvSpPr>
+            <a:spLocks noGrp="1"/>
+          </p:cNvSpPr>
+          <p:nvPr>
+            <p:ph type="sldNum" sz="quarter" idx="12"/>
+          </p:nvPr>
+        </p:nvSpPr>
+        <p:spPr/>
+        <p:txBody>
+          <a:bodyPr/>
+          <a:lstStyle/>
+          <a:p>
+            <a:fld id="{C5EF2332-01BF-834F-8236-50238282D533}" type="slidenum">
+              <a:rPr lang="en-US" smtClean="0"/>
+              <a:t>‹N°›</a:t>
+            </a:fld>
+            <a:endParaRPr lang="en-US"/>
+          </a:p>
+        </p:txBody>
+      </p:sp>
+    </p:spTree>
+    <p:extLst>
+      <p:ext uri="{BB962C8B-B14F-4D97-AF65-F5344CB8AC3E}">
+        <p14:creationId xmlns:p14="http://schemas.microsoft.com/office/powerpoint/2010/main" val="3540895647"/>
+      </p:ext>
+    </p:extLst>
+  </p:cSld>
+  <p:clrMapOvr>
+    <a:masterClrMapping/>
+  </p:clrMapOvr>
+</p:sldLayout>
+</file>
+
+<file path=ppt/slideLayouts/slideLayout11.xml><?xml version="1.0" encoding="utf-8"?>
+<p:sldLayout xmlns:a="http://schemas.openxmlformats.org/drawingml/2006/main" xmlns:r="http://schemas.openxmlformats.org/officeDocument/2006/relationships" xmlns:p="http://schemas.openxmlformats.org/presentationml/2006/main" type="picTx" preserve="1">
+  <p:cSld name="Picture with Caption">
+    <p:spTree>
+      <p:nvGrpSpPr>
+        <p:cNvPr id="1" name=""/>
+        <p:cNvGrpSpPr/>
+        <p:nvPr/>
+      </p:nvGrpSpPr>
+      <p:grpSpPr>
+        <a:xfrm>
+          <a:off x="0" y="0"/>
+          <a:ext cx="0" cy="0"/>
+          <a:chOff x="0" y="0"/>
+          <a:chExt cx="0" cy="0"/>
+        </a:xfrm>
+      </p:grpSpPr>
+      <p:sp>
+        <p:nvSpPr>
+          <p:cNvPr id="2" name="Title 1"/>
+          <p:cNvSpPr>
+            <a:spLocks noGrp="1"/>
+          </p:cNvSpPr>
+          <p:nvPr>
+            <p:ph type="title"/>
+          </p:nvPr>
+        </p:nvSpPr>
+        <p:spPr>
+          <a:xfrm>
+            <a:off x="1792288" y="3600450"/>
+            <a:ext cx="5486400" cy="425054"/>
+          </a:xfrm>
+        </p:spPr>
+        <p:txBody>
+          <a:bodyPr anchor="b"/>
+          <a:lstStyle>
+            <a:lvl1pPr algn="l">
+              <a:defRPr sz="1500" b="1"/>
+            </a:lvl1pPr>
+          </a:lstStyle>
+          <a:p>
+            <a:r>
+              <a:rPr lang="en-US"/>
+              <a:t>Click to edit Master title style</a:t>
+            </a:r>
+          </a:p>
+        </p:txBody>
+      </p:sp>
+      <p:sp>
+        <p:nvSpPr>
+          <p:cNvPr id="3" name="Picture Placeholder 2"/>
+          <p:cNvSpPr>
+            <a:spLocks noGrp="1"/>
+          </p:cNvSpPr>
+          <p:nvPr>
+            <p:ph type="pic" idx="1"/>
+          </p:nvPr>
+        </p:nvSpPr>
+        <p:spPr>
+          <a:xfrm>
+            <a:off x="1792288" y="459581"/>
+            <a:ext cx="5486400" cy="3086100"/>
+          </a:xfrm>
+        </p:spPr>
+        <p:txBody>
+          <a:bodyPr/>
+          <a:lstStyle>
+            <a:lvl1pPr marL="0" indent="0">
+              <a:buNone/>
+              <a:defRPr sz="2400"/>
+            </a:lvl1pPr>
+            <a:lvl2pPr marL="342900" indent="0">
+              <a:buNone/>
+              <a:defRPr sz="2100"/>
+            </a:lvl2pPr>
+            <a:lvl3pPr marL="685800" indent="0">
+              <a:buNone/>
+              <a:defRPr sz="1800"/>
+            </a:lvl3pPr>
+            <a:lvl4pPr marL="1028700" indent="0">
+              <a:buNone/>
+              <a:defRPr sz="1500"/>
+            </a:lvl4pPr>
+            <a:lvl5pPr marL="1371600" indent="0">
+              <a:buNone/>
+              <a:defRPr sz="1500"/>
+            </a:lvl5pPr>
+            <a:lvl6pPr marL="1714500" indent="0">
+              <a:buNone/>
+              <a:defRPr sz="1500"/>
+            </a:lvl6pPr>
+            <a:lvl7pPr marL="2057400" indent="0">
+              <a:buNone/>
+              <a:defRPr sz="1500"/>
+            </a:lvl7pPr>
+            <a:lvl8pPr marL="2400300" indent="0">
+              <a:buNone/>
+              <a:defRPr sz="1500"/>
+            </a:lvl8pPr>
+            <a:lvl9pPr marL="2743200" indent="0">
+              <a:buNone/>
+              <a:defRPr sz="1500"/>
+            </a:lvl9pPr>
+          </a:lstStyle>
+          <a:p>
+            <a:endParaRPr lang="en-US"/>
+          </a:p>
+        </p:txBody>
+      </p:sp>
+      <p:sp>
+        <p:nvSpPr>
+          <p:cNvPr id="4" name="Text Placeholder 3"/>
+          <p:cNvSpPr>
+            <a:spLocks noGrp="1"/>
+          </p:cNvSpPr>
+          <p:nvPr>
+            <p:ph type="body" sz="half" idx="2"/>
+          </p:nvPr>
+        </p:nvSpPr>
+        <p:spPr>
+          <a:xfrm>
+            <a:off x="1792288" y="4025503"/>
+            <a:ext cx="5486400" cy="603647"/>
+          </a:xfrm>
+        </p:spPr>
+        <p:txBody>
+          <a:bodyPr/>
+          <a:lstStyle>
+            <a:lvl1pPr marL="0" indent="0">
+              <a:buNone/>
+              <a:defRPr sz="1050"/>
+            </a:lvl1pPr>
+            <a:lvl2pPr marL="342900" indent="0">
+              <a:buNone/>
+              <a:defRPr sz="900"/>
+            </a:lvl2pPr>
+            <a:lvl3pPr marL="685800" indent="0">
+              <a:buNone/>
+              <a:defRPr sz="750"/>
+            </a:lvl3pPr>
+            <a:lvl4pPr marL="1028700" indent="0">
+              <a:buNone/>
+              <a:defRPr sz="675"/>
+            </a:lvl4pPr>
+            <a:lvl5pPr marL="1371600" indent="0">
+              <a:buNone/>
+              <a:defRPr sz="675"/>
+            </a:lvl5pPr>
+            <a:lvl6pPr marL="1714500" indent="0">
+              <a:buNone/>
+              <a:defRPr sz="675"/>
+            </a:lvl6pPr>
+            <a:lvl7pPr marL="2057400" indent="0">
+              <a:buNone/>
+              <a:defRPr sz="675"/>
+            </a:lvl7pPr>
+            <a:lvl8pPr marL="2400300" indent="0">
+              <a:buNone/>
+              <a:defRPr sz="675"/>
+            </a:lvl8pPr>
+            <a:lvl9pPr marL="2743200" indent="0">
+              <a:buNone/>
+              <a:defRPr sz="675"/>
+            </a:lvl9pPr>
+          </a:lstStyle>
+          <a:p>
+            <a:pPr lvl="0"/>
+            <a:r>
+              <a:rPr lang="en-US"/>
+              <a:t>Click to edit Master text styles</a:t>
+            </a:r>
+          </a:p>
+        </p:txBody>
+      </p:sp>
+      <p:sp>
+        <p:nvSpPr>
+          <p:cNvPr id="5" name="Date Placeholder 4"/>
+          <p:cNvSpPr>
+            <a:spLocks noGrp="1"/>
+          </p:cNvSpPr>
+          <p:nvPr>
+            <p:ph type="dt" sz="half" idx="10"/>
+          </p:nvPr>
+        </p:nvSpPr>
+        <p:spPr/>
+        <p:txBody>
+          <a:bodyPr/>
+          <a:lstStyle/>
+          <a:p>
+            <a:r>
+              <a:rPr lang="fr-FR"/>
+              <a:t>03/11/2022</a:t>
+            </a:r>
+            <a:endParaRPr lang="en-US"/>
+          </a:p>
+        </p:txBody>
+      </p:sp>
+      <p:sp>
+        <p:nvSpPr>
+          <p:cNvPr id="6" name="Footer Placeholder 5"/>
+          <p:cNvSpPr>
+            <a:spLocks noGrp="1"/>
+          </p:cNvSpPr>
+          <p:nvPr>
+            <p:ph type="ftr" sz="quarter" idx="11"/>
+          </p:nvPr>
+        </p:nvSpPr>
+        <p:spPr/>
+        <p:txBody>
+          <a:bodyPr/>
+          <a:lstStyle/>
+          <a:p>
+            <a:endParaRPr lang="en-US"/>
+          </a:p>
+        </p:txBody>
+      </p:sp>
+      <p:sp>
+        <p:nvSpPr>
+          <p:cNvPr id="7" name="Slide Number Placeholder 6"/>
+          <p:cNvSpPr>
+            <a:spLocks noGrp="1"/>
+          </p:cNvSpPr>
+          <p:nvPr>
+            <p:ph type="sldNum" sz="quarter" idx="12"/>
+          </p:nvPr>
+        </p:nvSpPr>
+        <p:spPr/>
+        <p:txBody>
+          <a:bodyPr/>
+          <a:lstStyle/>
+          <a:p>
+            <a:fld id="{C5EF2332-01BF-834F-8236-50238282D533}" type="slidenum">
+              <a:rPr lang="en-US" smtClean="0"/>
+              <a:t>‹N°›</a:t>
+            </a:fld>
+            <a:endParaRPr lang="en-US"/>
+          </a:p>
+        </p:txBody>
+      </p:sp>
+    </p:spTree>
+    <p:extLst>
+      <p:ext uri="{BB962C8B-B14F-4D97-AF65-F5344CB8AC3E}">
+        <p14:creationId xmlns:p14="http://schemas.microsoft.com/office/powerpoint/2010/main" val="3566899855"/>
+      </p:ext>
+    </p:extLst>
+  </p:cSld>
+  <p:clrMapOvr>
+    <a:masterClrMapping/>
+  </p:clrMapOvr>
+</p:sldLayout>
+</file>
+
+<file path=ppt/slideLayouts/slideLayout12.xml><?xml version="1.0" encoding="utf-8"?>
 <p:sldLayout xmlns:a="http://schemas.openxmlformats.org/drawingml/2006/main" xmlns:r="http://schemas.openxmlformats.org/officeDocument/2006/relationships" xmlns:p="http://schemas.openxmlformats.org/presentationml/2006/main" type="vertTx" preserve="1">
   <p:cSld name="Title and Vertical Text">
     <p:spTree>
@@ -471,10 +1401,10 @@
           <a:bodyPr/>
           <a:lstStyle/>
           <a:p>
-            <a:fld id="{241EB5C9-1307-BA42-ABA2-0BC069CD8E7F}" type="datetimeFigureOut">
-              <a:rPr lang="en-US" smtClean="0"/>
-              <a:t>10/27/22</a:t>
-            </a:fld>
+            <a:r>
+              <a:rPr lang="fr-FR"/>
+              <a:t>03/11/2022</a:t>
+            </a:r>
             <a:endParaRPr lang="en-US"/>
           </a:p>
         </p:txBody>
@@ -534,7 +1464,7 @@
 </p:sldLayout>
 </file>
 
-<file path=ppt/slideLayouts/slideLayout11.xml><?xml version="1.0" encoding="utf-8"?>
+<file path=ppt/slideLayouts/slideLayout13.xml><?xml version="1.0" encoding="utf-8"?>
 <p:sldLayout xmlns:a="http://schemas.openxmlformats.org/drawingml/2006/main" xmlns:r="http://schemas.openxmlformats.org/officeDocument/2006/relationships" xmlns:p="http://schemas.openxmlformats.org/presentationml/2006/main" type="vertTitleAndTx" preserve="1">
   <p:cSld name="Vertical Title and Text">
     <p:spTree>
@@ -649,10 +1579,10 @@
           <a:bodyPr/>
           <a:lstStyle/>
           <a:p>
-            <a:fld id="{241EB5C9-1307-BA42-ABA2-0BC069CD8E7F}" type="datetimeFigureOut">
-              <a:rPr lang="en-US" smtClean="0"/>
-              <a:t>10/27/22</a:t>
-            </a:fld>
+            <a:r>
+              <a:rPr lang="fr-FR"/>
+              <a:t>03/11/2022</a:t>
+            </a:r>
             <a:endParaRPr lang="en-US"/>
           </a:p>
         </p:txBody>
@@ -713,8 +1643,8 @@
 </file>
 
 <file path=ppt/slideLayouts/slideLayout2.xml><?xml version="1.0" encoding="utf-8"?>
-<p:sldLayout xmlns:a="http://schemas.openxmlformats.org/drawingml/2006/main" xmlns:r="http://schemas.openxmlformats.org/officeDocument/2006/relationships" xmlns:p="http://schemas.openxmlformats.org/presentationml/2006/main" preserve="1" userDrawn="1">
-  <p:cSld name="Title and Content">
+<p:sldLayout xmlns:a="http://schemas.openxmlformats.org/drawingml/2006/main" xmlns:r="http://schemas.openxmlformats.org/officeDocument/2006/relationships" xmlns:p="http://schemas.openxmlformats.org/presentationml/2006/main" type="title" preserve="1">
+  <p:cSld name="Title Slide bis">
     <p:spTree>
       <p:nvGrpSpPr>
         <p:cNvPr id="1" name=""/>
@@ -736,10 +1666,15 @@
             <a:spLocks noGrp="1"/>
           </p:cNvSpPr>
           <p:nvPr>
-            <p:ph type="title"/>
-          </p:nvPr>
-        </p:nvSpPr>
-        <p:spPr/>
+            <p:ph type="ctrTitle"/>
+          </p:nvPr>
+        </p:nvSpPr>
+        <p:spPr>
+          <a:xfrm>
+            <a:off x="685800" y="1597819"/>
+            <a:ext cx="7772400" cy="1102519"/>
+          </a:xfrm>
+        </p:spPr>
         <p:txBody>
           <a:bodyPr/>
           <a:lstStyle/>
@@ -753,6 +1688,440 @@
       </p:sp>
       <p:sp>
         <p:nvSpPr>
+          <p:cNvPr id="3" name="Subtitle 2"/>
+          <p:cNvSpPr>
+            <a:spLocks noGrp="1"/>
+          </p:cNvSpPr>
+          <p:nvPr>
+            <p:ph type="subTitle" idx="1"/>
+          </p:nvPr>
+        </p:nvSpPr>
+        <p:spPr>
+          <a:xfrm>
+            <a:off x="1371600" y="2914650"/>
+            <a:ext cx="6400800" cy="1314450"/>
+          </a:xfrm>
+        </p:spPr>
+        <p:txBody>
+          <a:bodyPr/>
+          <a:lstStyle>
+            <a:lvl1pPr marL="0" indent="0" algn="ctr">
+              <a:buNone/>
+              <a:defRPr>
+                <a:solidFill>
+                  <a:schemeClr val="tx1">
+                    <a:tint val="75000"/>
+                  </a:schemeClr>
+                </a:solidFill>
+              </a:defRPr>
+            </a:lvl1pPr>
+            <a:lvl2pPr marL="342900" indent="0" algn="ctr">
+              <a:buNone/>
+              <a:defRPr>
+                <a:solidFill>
+                  <a:schemeClr val="tx1">
+                    <a:tint val="75000"/>
+                  </a:schemeClr>
+                </a:solidFill>
+              </a:defRPr>
+            </a:lvl2pPr>
+            <a:lvl3pPr marL="685800" indent="0" algn="ctr">
+              <a:buNone/>
+              <a:defRPr>
+                <a:solidFill>
+                  <a:schemeClr val="tx1">
+                    <a:tint val="75000"/>
+                  </a:schemeClr>
+                </a:solidFill>
+              </a:defRPr>
+            </a:lvl3pPr>
+            <a:lvl4pPr marL="1028700" indent="0" algn="ctr">
+              <a:buNone/>
+              <a:defRPr>
+                <a:solidFill>
+                  <a:schemeClr val="tx1">
+                    <a:tint val="75000"/>
+                  </a:schemeClr>
+                </a:solidFill>
+              </a:defRPr>
+            </a:lvl4pPr>
+            <a:lvl5pPr marL="1371600" indent="0" algn="ctr">
+              <a:buNone/>
+              <a:defRPr>
+                <a:solidFill>
+                  <a:schemeClr val="tx1">
+                    <a:tint val="75000"/>
+                  </a:schemeClr>
+                </a:solidFill>
+              </a:defRPr>
+            </a:lvl5pPr>
+            <a:lvl6pPr marL="1714500" indent="0" algn="ctr">
+              <a:buNone/>
+              <a:defRPr>
+                <a:solidFill>
+                  <a:schemeClr val="tx1">
+                    <a:tint val="75000"/>
+                  </a:schemeClr>
+                </a:solidFill>
+              </a:defRPr>
+            </a:lvl6pPr>
+            <a:lvl7pPr marL="2057400" indent="0" algn="ctr">
+              <a:buNone/>
+              <a:defRPr>
+                <a:solidFill>
+                  <a:schemeClr val="tx1">
+                    <a:tint val="75000"/>
+                  </a:schemeClr>
+                </a:solidFill>
+              </a:defRPr>
+            </a:lvl7pPr>
+            <a:lvl8pPr marL="2400300" indent="0" algn="ctr">
+              <a:buNone/>
+              <a:defRPr>
+                <a:solidFill>
+                  <a:schemeClr val="tx1">
+                    <a:tint val="75000"/>
+                  </a:schemeClr>
+                </a:solidFill>
+              </a:defRPr>
+            </a:lvl8pPr>
+            <a:lvl9pPr marL="2743200" indent="0" algn="ctr">
+              <a:buNone/>
+              <a:defRPr>
+                <a:solidFill>
+                  <a:schemeClr val="tx1">
+                    <a:tint val="75000"/>
+                  </a:schemeClr>
+                </a:solidFill>
+              </a:defRPr>
+            </a:lvl9pPr>
+          </a:lstStyle>
+          <a:p>
+            <a:r>
+              <a:rPr lang="en-US"/>
+              <a:t>Click to edit Master subtitle style</a:t>
+            </a:r>
+          </a:p>
+        </p:txBody>
+      </p:sp>
+      <p:sp>
+        <p:nvSpPr>
+          <p:cNvPr id="4" name="Date Placeholder 3"/>
+          <p:cNvSpPr>
+            <a:spLocks noGrp="1"/>
+          </p:cNvSpPr>
+          <p:nvPr>
+            <p:ph type="dt" sz="half" idx="10"/>
+          </p:nvPr>
+        </p:nvSpPr>
+        <p:spPr/>
+        <p:txBody>
+          <a:bodyPr/>
+          <a:lstStyle/>
+          <a:p>
+            <a:r>
+              <a:rPr lang="fr-FR"/>
+              <a:t>03/11/2022</a:t>
+            </a:r>
+            <a:endParaRPr lang="en-US"/>
+          </a:p>
+        </p:txBody>
+      </p:sp>
+      <p:sp>
+        <p:nvSpPr>
+          <p:cNvPr id="5" name="Footer Placeholder 4"/>
+          <p:cNvSpPr>
+            <a:spLocks noGrp="1"/>
+          </p:cNvSpPr>
+          <p:nvPr>
+            <p:ph type="ftr" sz="quarter" idx="11"/>
+          </p:nvPr>
+        </p:nvSpPr>
+        <p:spPr/>
+        <p:txBody>
+          <a:bodyPr/>
+          <a:lstStyle/>
+          <a:p>
+            <a:endParaRPr lang="en-US"/>
+          </a:p>
+        </p:txBody>
+      </p:sp>
+      <p:sp>
+        <p:nvSpPr>
+          <p:cNvPr id="6" name="Slide Number Placeholder 5"/>
+          <p:cNvSpPr>
+            <a:spLocks noGrp="1"/>
+          </p:cNvSpPr>
+          <p:nvPr>
+            <p:ph type="sldNum" sz="quarter" idx="12"/>
+          </p:nvPr>
+        </p:nvSpPr>
+        <p:spPr/>
+        <p:txBody>
+          <a:bodyPr/>
+          <a:lstStyle/>
+          <a:p>
+            <a:fld id="{C5EF2332-01BF-834F-8236-50238282D533}" type="slidenum">
+              <a:rPr lang="en-US" smtClean="0"/>
+              <a:t>‹N°›</a:t>
+            </a:fld>
+            <a:endParaRPr lang="en-US"/>
+          </a:p>
+        </p:txBody>
+      </p:sp>
+    </p:spTree>
+    <p:extLst>
+      <p:ext uri="{BB962C8B-B14F-4D97-AF65-F5344CB8AC3E}">
+        <p14:creationId xmlns:p14="http://schemas.microsoft.com/office/powerpoint/2010/main" val="1444357513"/>
+      </p:ext>
+    </p:extLst>
+  </p:cSld>
+  <p:clrMapOvr>
+    <a:masterClrMapping/>
+  </p:clrMapOvr>
+</p:sldLayout>
+</file>
+
+<file path=ppt/slideLayouts/slideLayout3.xml><?xml version="1.0" encoding="utf-8"?>
+<p:sldLayout xmlns:a="http://schemas.openxmlformats.org/drawingml/2006/main" xmlns:r="http://schemas.openxmlformats.org/officeDocument/2006/relationships" xmlns:p="http://schemas.openxmlformats.org/presentationml/2006/main" preserve="1" userDrawn="1">
+  <p:cSld name="2_Title Slide">
+    <p:spTree>
+      <p:nvGrpSpPr>
+        <p:cNvPr id="1" name=""/>
+        <p:cNvGrpSpPr/>
+        <p:nvPr/>
+      </p:nvGrpSpPr>
+      <p:grpSpPr>
+        <a:xfrm>
+          <a:off x="0" y="0"/>
+          <a:ext cx="0" cy="0"/>
+          <a:chOff x="0" y="0"/>
+          <a:chExt cx="0" cy="0"/>
+        </a:xfrm>
+      </p:grpSpPr>
+      <p:sp>
+        <p:nvSpPr>
+          <p:cNvPr id="5" name="Footer Placeholder 4"/>
+          <p:cNvSpPr>
+            <a:spLocks noGrp="1"/>
+          </p:cNvSpPr>
+          <p:nvPr>
+            <p:ph type="ftr" sz="quarter" idx="11"/>
+          </p:nvPr>
+        </p:nvSpPr>
+        <p:spPr/>
+        <p:txBody>
+          <a:bodyPr/>
+          <a:lstStyle/>
+          <a:p>
+            <a:endParaRPr lang="en-US"/>
+          </a:p>
+        </p:txBody>
+      </p:sp>
+      <p:pic>
+        <p:nvPicPr>
+          <p:cNvPr id="8" name="Espace réservé pour une image  7" descr="110.jpg">
+            <a:extLst>
+              <a:ext uri="{FF2B5EF4-FFF2-40B4-BE49-F238E27FC236}">
+                <a16:creationId xmlns:a16="http://schemas.microsoft.com/office/drawing/2014/main" id="{30F14533-08D6-8908-9A86-1BD2C9A60E7F}"/>
+              </a:ext>
+            </a:extLst>
+          </p:cNvPr>
+          <p:cNvPicPr>
+            <a:picLocks noChangeAspect="1"/>
+          </p:cNvPicPr>
+          <p:nvPr userDrawn="1"/>
+        </p:nvPicPr>
+        <p:blipFill>
+          <a:blip r:embed="rId2">
+            <a:extLst>
+              <a:ext uri="{28A0092B-C50C-407E-A947-70E740481C1C}">
+                <a14:useLocalDpi xmlns:a14="http://schemas.microsoft.com/office/drawing/2010/main" val="0"/>
+              </a:ext>
+            </a:extLst>
+          </a:blip>
+          <a:srcRect t="15646" b="15646"/>
+          <a:stretch>
+            <a:fillRect/>
+          </a:stretch>
+        </p:blipFill>
+        <p:spPr>
+          <a:xfrm>
+            <a:off x="0" y="738000"/>
+            <a:ext cx="9144000" cy="4443958"/>
+          </a:xfrm>
+          <a:prstGeom prst="rect">
+            <a:avLst/>
+          </a:prstGeom>
+        </p:spPr>
+      </p:pic>
+      <p:sp>
+        <p:nvSpPr>
+          <p:cNvPr id="2" name="Title 1"/>
+          <p:cNvSpPr>
+            <a:spLocks noGrp="1"/>
+          </p:cNvSpPr>
+          <p:nvPr>
+            <p:ph type="ctrTitle" hasCustomPrompt="1"/>
+          </p:nvPr>
+        </p:nvSpPr>
+        <p:spPr>
+          <a:xfrm>
+            <a:off x="511200" y="889200"/>
+            <a:ext cx="8424000" cy="3906000"/>
+          </a:xfrm>
+        </p:spPr>
+        <p:txBody>
+          <a:bodyPr lIns="0" tIns="46800" rIns="90000" bIns="360000"/>
+          <a:lstStyle>
+            <a:lvl1pPr>
+              <a:defRPr sz="4000"/>
+            </a:lvl1pPr>
+          </a:lstStyle>
+          <a:p>
+            <a:r>
+              <a:rPr lang="en-US" dirty="0"/>
+              <a:t>Click to edit Master title style</a:t>
+            </a:r>
+          </a:p>
+        </p:txBody>
+      </p:sp>
+      <p:cxnSp>
+        <p:nvCxnSpPr>
+          <p:cNvPr id="9" name="Connecteur droit 8">
+            <a:extLst>
+              <a:ext uri="{FF2B5EF4-FFF2-40B4-BE49-F238E27FC236}">
+                <a16:creationId xmlns:a16="http://schemas.microsoft.com/office/drawing/2014/main" id="{8E937E5D-C300-4922-572B-840ED27CCC38}"/>
+              </a:ext>
+            </a:extLst>
+          </p:cNvPr>
+          <p:cNvCxnSpPr/>
+          <p:nvPr userDrawn="1"/>
+        </p:nvCxnSpPr>
+        <p:spPr>
+          <a:xfrm flipH="1">
+            <a:off x="0" y="738000"/>
+            <a:ext cx="9144000" cy="0"/>
+          </a:xfrm>
+          <a:prstGeom prst="line">
+            <a:avLst/>
+          </a:prstGeom>
+          <a:ln>
+            <a:solidFill>
+              <a:schemeClr val="tx2"/>
+            </a:solidFill>
+          </a:ln>
+        </p:spPr>
+        <p:style>
+          <a:lnRef idx="1">
+            <a:schemeClr val="accent1"/>
+          </a:lnRef>
+          <a:fillRef idx="0">
+            <a:schemeClr val="accent1"/>
+          </a:fillRef>
+          <a:effectRef idx="0">
+            <a:schemeClr val="accent1"/>
+          </a:effectRef>
+          <a:fontRef idx="minor">
+            <a:schemeClr val="tx1"/>
+          </a:fontRef>
+        </p:style>
+      </p:cxnSp>
+      <p:cxnSp>
+        <p:nvCxnSpPr>
+          <p:cNvPr id="10" name="Connecteur droit 9">
+            <a:extLst>
+              <a:ext uri="{FF2B5EF4-FFF2-40B4-BE49-F238E27FC236}">
+                <a16:creationId xmlns:a16="http://schemas.microsoft.com/office/drawing/2014/main" id="{CA8342A9-FFB1-9193-0BAB-85DD3C3BB9C8}"/>
+              </a:ext>
+            </a:extLst>
+          </p:cNvPr>
+          <p:cNvCxnSpPr/>
+          <p:nvPr userDrawn="1"/>
+        </p:nvCxnSpPr>
+        <p:spPr>
+          <a:xfrm flipH="1">
+            <a:off x="1116000" y="4384994"/>
+            <a:ext cx="7668000" cy="0"/>
+          </a:xfrm>
+          <a:prstGeom prst="line">
+            <a:avLst/>
+          </a:prstGeom>
+          <a:ln>
+            <a:solidFill>
+              <a:schemeClr val="tx2"/>
+            </a:solidFill>
+          </a:ln>
+        </p:spPr>
+        <p:style>
+          <a:lnRef idx="1">
+            <a:schemeClr val="accent1"/>
+          </a:lnRef>
+          <a:fillRef idx="0">
+            <a:schemeClr val="accent1"/>
+          </a:fillRef>
+          <a:effectRef idx="0">
+            <a:schemeClr val="accent1"/>
+          </a:effectRef>
+          <a:fontRef idx="minor">
+            <a:schemeClr val="tx1"/>
+          </a:fontRef>
+        </p:style>
+      </p:cxnSp>
+    </p:spTree>
+    <p:extLst>
+      <p:ext uri="{BB962C8B-B14F-4D97-AF65-F5344CB8AC3E}">
+        <p14:creationId xmlns:p14="http://schemas.microsoft.com/office/powerpoint/2010/main" val="721865367"/>
+      </p:ext>
+    </p:extLst>
+  </p:cSld>
+  <p:clrMapOvr>
+    <a:masterClrMapping/>
+  </p:clrMapOvr>
+</p:sldLayout>
+</file>
+
+<file path=ppt/slideLayouts/slideLayout4.xml><?xml version="1.0" encoding="utf-8"?>
+<p:sldLayout xmlns:a="http://schemas.openxmlformats.org/drawingml/2006/main" xmlns:r="http://schemas.openxmlformats.org/officeDocument/2006/relationships" xmlns:p="http://schemas.openxmlformats.org/presentationml/2006/main" preserve="1" userDrawn="1">
+  <p:cSld name="Comparison">
+    <p:spTree>
+      <p:nvGrpSpPr>
+        <p:cNvPr id="1" name=""/>
+        <p:cNvGrpSpPr/>
+        <p:nvPr/>
+      </p:nvGrpSpPr>
+      <p:grpSpPr>
+        <a:xfrm>
+          <a:off x="0" y="0"/>
+          <a:ext cx="0" cy="0"/>
+          <a:chOff x="0" y="0"/>
+          <a:chExt cx="0" cy="0"/>
+        </a:xfrm>
+      </p:grpSpPr>
+      <p:sp>
+        <p:nvSpPr>
+          <p:cNvPr id="2" name="Title 1"/>
+          <p:cNvSpPr>
+            <a:spLocks noGrp="1"/>
+          </p:cNvSpPr>
+          <p:nvPr>
+            <p:ph type="title"/>
+          </p:nvPr>
+        </p:nvSpPr>
+        <p:spPr/>
+        <p:txBody>
+          <a:bodyPr/>
+          <a:lstStyle/>
+          <a:p>
+            <a:r>
+              <a:rPr lang="en-US"/>
+              <a:t>Click to edit Master title style</a:t>
+            </a:r>
+          </a:p>
+        </p:txBody>
+      </p:sp>
+      <p:sp>
+        <p:nvSpPr>
           <p:cNvPr id="3" name="Content Placeholder 2"/>
           <p:cNvSpPr>
             <a:spLocks noGrp="1"/>
@@ -761,7 +2130,12 @@
             <p:ph idx="1"/>
           </p:nvPr>
         </p:nvSpPr>
-        <p:spPr/>
+        <p:spPr>
+          <a:xfrm>
+            <a:off x="324000" y="1706400"/>
+            <a:ext cx="2520000" cy="2880000"/>
+          </a:xfrm>
+        </p:spPr>
         <p:txBody>
           <a:bodyPr/>
           <a:lstStyle/>
@@ -817,10 +2191,10 @@
           <a:bodyPr/>
           <a:lstStyle/>
           <a:p>
-            <a:fld id="{241EB5C9-1307-BA42-ABA2-0BC069CD8E7F}" type="datetimeFigureOut">
-              <a:rPr lang="en-US" smtClean="0"/>
-              <a:t>10/27/22</a:t>
-            </a:fld>
+            <a:r>
+              <a:rPr lang="fr-FR"/>
+              <a:t>03/11/2022</a:t>
+            </a:r>
             <a:endParaRPr lang="en-US"/>
           </a:p>
         </p:txBody>
@@ -928,6 +2302,68 @@
           </a:p>
         </p:txBody>
       </p:sp>
+      <p:sp>
+        <p:nvSpPr>
+          <p:cNvPr id="7" name="Content Placeholder 2">
+            <a:extLst>
+              <a:ext uri="{FF2B5EF4-FFF2-40B4-BE49-F238E27FC236}">
+                <a16:creationId xmlns:a16="http://schemas.microsoft.com/office/drawing/2014/main" id="{CA31FC27-A2F8-9A75-9E93-5851D9757D67}"/>
+              </a:ext>
+            </a:extLst>
+          </p:cNvPr>
+          <p:cNvSpPr>
+            <a:spLocks noGrp="1"/>
+          </p:cNvSpPr>
+          <p:nvPr>
+            <p:ph idx="14"/>
+          </p:nvPr>
+        </p:nvSpPr>
+        <p:spPr>
+          <a:xfrm>
+            <a:off x="3132000" y="1706400"/>
+            <a:ext cx="5616000" cy="2880000"/>
+          </a:xfrm>
+        </p:spPr>
+        <p:txBody>
+          <a:bodyPr/>
+          <a:lstStyle/>
+          <a:p>
+            <a:pPr lvl="0"/>
+            <a:r>
+              <a:rPr lang="en-US"/>
+              <a:t>Click to edit Master text styles</a:t>
+            </a:r>
+          </a:p>
+          <a:p>
+            <a:pPr lvl="1"/>
+            <a:r>
+              <a:rPr lang="en-US"/>
+              <a:t>Second level</a:t>
+            </a:r>
+          </a:p>
+          <a:p>
+            <a:pPr lvl="2"/>
+            <a:r>
+              <a:rPr lang="en-US"/>
+              <a:t>Third level</a:t>
+            </a:r>
+          </a:p>
+          <a:p>
+            <a:pPr lvl="3"/>
+            <a:r>
+              <a:rPr lang="en-US"/>
+              <a:t>Fourth level</a:t>
+            </a:r>
+          </a:p>
+          <a:p>
+            <a:pPr lvl="4"/>
+            <a:r>
+              <a:rPr lang="en-US"/>
+              <a:t>Fifth level</a:t>
+            </a:r>
+          </a:p>
+        </p:txBody>
+      </p:sp>
     </p:spTree>
     <p:extLst>
       <p:ext uri="{BB962C8B-B14F-4D97-AF65-F5344CB8AC3E}">
@@ -941,7 +2377,236 @@
 </p:sldLayout>
 </file>
 
-<file path=ppt/slideLayouts/slideLayout3.xml><?xml version="1.0" encoding="utf-8"?>
+<file path=ppt/slideLayouts/slideLayout5.xml><?xml version="1.0" encoding="utf-8"?>
+<p:sldLayout xmlns:a="http://schemas.openxmlformats.org/drawingml/2006/main" xmlns:r="http://schemas.openxmlformats.org/officeDocument/2006/relationships" xmlns:p="http://schemas.openxmlformats.org/presentationml/2006/main" preserve="1" userDrawn="1">
+  <p:cSld name="Title and Content">
+    <p:spTree>
+      <p:nvGrpSpPr>
+        <p:cNvPr id="1" name=""/>
+        <p:cNvGrpSpPr/>
+        <p:nvPr/>
+      </p:nvGrpSpPr>
+      <p:grpSpPr>
+        <a:xfrm>
+          <a:off x="0" y="0"/>
+          <a:ext cx="0" cy="0"/>
+          <a:chOff x="0" y="0"/>
+          <a:chExt cx="0" cy="0"/>
+        </a:xfrm>
+      </p:grpSpPr>
+      <p:sp>
+        <p:nvSpPr>
+          <p:cNvPr id="2" name="Title 1"/>
+          <p:cNvSpPr>
+            <a:spLocks noGrp="1"/>
+          </p:cNvSpPr>
+          <p:nvPr>
+            <p:ph type="title"/>
+          </p:nvPr>
+        </p:nvSpPr>
+        <p:spPr/>
+        <p:txBody>
+          <a:bodyPr/>
+          <a:lstStyle/>
+          <a:p>
+            <a:r>
+              <a:rPr lang="en-US"/>
+              <a:t>Click to edit Master title style</a:t>
+            </a:r>
+          </a:p>
+        </p:txBody>
+      </p:sp>
+      <p:sp>
+        <p:nvSpPr>
+          <p:cNvPr id="3" name="Content Placeholder 2"/>
+          <p:cNvSpPr>
+            <a:spLocks noGrp="1"/>
+          </p:cNvSpPr>
+          <p:nvPr>
+            <p:ph idx="1"/>
+          </p:nvPr>
+        </p:nvSpPr>
+        <p:spPr/>
+        <p:txBody>
+          <a:bodyPr/>
+          <a:lstStyle/>
+          <a:p>
+            <a:pPr lvl="0"/>
+            <a:r>
+              <a:rPr lang="en-US"/>
+              <a:t>Click to edit Master text styles</a:t>
+            </a:r>
+          </a:p>
+          <a:p>
+            <a:pPr lvl="1"/>
+            <a:r>
+              <a:rPr lang="en-US"/>
+              <a:t>Second level</a:t>
+            </a:r>
+          </a:p>
+          <a:p>
+            <a:pPr lvl="2"/>
+            <a:r>
+              <a:rPr lang="en-US"/>
+              <a:t>Third level</a:t>
+            </a:r>
+          </a:p>
+          <a:p>
+            <a:pPr lvl="3"/>
+            <a:r>
+              <a:rPr lang="en-US"/>
+              <a:t>Fourth level</a:t>
+            </a:r>
+          </a:p>
+          <a:p>
+            <a:pPr lvl="4"/>
+            <a:r>
+              <a:rPr lang="en-US"/>
+              <a:t>Fifth level</a:t>
+            </a:r>
+          </a:p>
+        </p:txBody>
+      </p:sp>
+      <p:sp>
+        <p:nvSpPr>
+          <p:cNvPr id="4" name="Date Placeholder 3"/>
+          <p:cNvSpPr>
+            <a:spLocks noGrp="1"/>
+          </p:cNvSpPr>
+          <p:nvPr>
+            <p:ph type="dt" sz="half" idx="10"/>
+          </p:nvPr>
+        </p:nvSpPr>
+        <p:spPr/>
+        <p:txBody>
+          <a:bodyPr/>
+          <a:lstStyle/>
+          <a:p>
+            <a:r>
+              <a:rPr lang="fr-FR"/>
+              <a:t>03/11/2022</a:t>
+            </a:r>
+            <a:endParaRPr lang="en-US"/>
+          </a:p>
+        </p:txBody>
+      </p:sp>
+      <p:sp>
+        <p:nvSpPr>
+          <p:cNvPr id="5" name="Footer Placeholder 4"/>
+          <p:cNvSpPr>
+            <a:spLocks noGrp="1"/>
+          </p:cNvSpPr>
+          <p:nvPr>
+            <p:ph type="ftr" sz="quarter" idx="11"/>
+          </p:nvPr>
+        </p:nvSpPr>
+        <p:spPr/>
+        <p:txBody>
+          <a:bodyPr/>
+          <a:lstStyle/>
+          <a:p>
+            <a:endParaRPr lang="en-US"/>
+          </a:p>
+        </p:txBody>
+      </p:sp>
+      <p:sp>
+        <p:nvSpPr>
+          <p:cNvPr id="6" name="Slide Number Placeholder 5"/>
+          <p:cNvSpPr>
+            <a:spLocks noGrp="1"/>
+          </p:cNvSpPr>
+          <p:nvPr>
+            <p:ph type="sldNum" sz="quarter" idx="12"/>
+          </p:nvPr>
+        </p:nvSpPr>
+        <p:spPr/>
+        <p:txBody>
+          <a:bodyPr/>
+          <a:lstStyle/>
+          <a:p>
+            <a:fld id="{C5EF2332-01BF-834F-8236-50238282D533}" type="slidenum">
+              <a:rPr lang="en-US" smtClean="0"/>
+              <a:t>‹N°›</a:t>
+            </a:fld>
+            <a:endParaRPr lang="en-US"/>
+          </a:p>
+        </p:txBody>
+      </p:sp>
+      <p:sp>
+        <p:nvSpPr>
+          <p:cNvPr id="8" name="Espace réservé du texte 7">
+            <a:extLst>
+              <a:ext uri="{FF2B5EF4-FFF2-40B4-BE49-F238E27FC236}">
+                <a16:creationId xmlns:a16="http://schemas.microsoft.com/office/drawing/2014/main" id="{297D3920-63DD-4568-B5A5-5100F43856FF}"/>
+              </a:ext>
+            </a:extLst>
+          </p:cNvPr>
+          <p:cNvSpPr>
+            <a:spLocks noGrp="1"/>
+          </p:cNvSpPr>
+          <p:nvPr>
+            <p:ph type="body" sz="quarter" idx="13"/>
+          </p:nvPr>
+        </p:nvSpPr>
+        <p:spPr>
+          <a:xfrm>
+            <a:off x="324000" y="1249200"/>
+            <a:ext cx="8424000" cy="241200"/>
+          </a:xfrm>
+        </p:spPr>
+        <p:txBody>
+          <a:bodyPr vert="horz" lIns="0" tIns="0" rIns="0" bIns="0" rtlCol="0" anchor="t" anchorCtr="0">
+            <a:noAutofit/>
+          </a:bodyPr>
+          <a:lstStyle>
+            <a:lvl1pPr>
+              <a:defRPr lang="fr-FR" sz="1500" b="1" dirty="0" smtClean="0">
+                <a:solidFill>
+                  <a:schemeClr val="tx1">
+                    <a:lumMod val="50000"/>
+                    <a:lumOff val="50000"/>
+                  </a:schemeClr>
+                </a:solidFill>
+                <a:ea typeface="Marianne" charset="0"/>
+                <a:cs typeface="Marianne" charset="0"/>
+              </a:defRPr>
+            </a:lvl1pPr>
+          </a:lstStyle>
+          <a:p>
+            <a:pPr marL="9525" lvl="0" indent="85725" defTabSz="914400">
+              <a:lnSpc>
+                <a:spcPct val="100000"/>
+              </a:lnSpc>
+              <a:spcBef>
+                <a:spcPts val="400"/>
+              </a:spcBef>
+              <a:spcAft>
+                <a:spcPts val="800"/>
+              </a:spcAft>
+              <a:buFont typeface="+mj-lt"/>
+              <a:tabLst/>
+            </a:pPr>
+            <a:r>
+              <a:rPr lang="fr-FR" dirty="0"/>
+              <a:t>Cliquez pour modifier les styles du texte du masque</a:t>
+            </a:r>
+          </a:p>
+        </p:txBody>
+      </p:sp>
+    </p:spTree>
+    <p:extLst>
+      <p:ext uri="{BB962C8B-B14F-4D97-AF65-F5344CB8AC3E}">
+        <p14:creationId xmlns:p14="http://schemas.microsoft.com/office/powerpoint/2010/main" val="2916549195"/>
+      </p:ext>
+    </p:extLst>
+  </p:cSld>
+  <p:clrMapOvr>
+    <a:masterClrMapping/>
+  </p:clrMapOvr>
+</p:sldLayout>
+</file>
+
+<file path=ppt/slideLayouts/slideLayout6.xml><?xml version="1.0" encoding="utf-8"?>
 <p:sldLayout xmlns:a="http://schemas.openxmlformats.org/drawingml/2006/main" xmlns:r="http://schemas.openxmlformats.org/officeDocument/2006/relationships" xmlns:p="http://schemas.openxmlformats.org/presentationml/2006/main" type="secHead" preserve="1">
   <p:cSld name="Section Header">
     <p:spTree>
@@ -1123,10 +2788,10 @@
           <a:bodyPr/>
           <a:lstStyle/>
           <a:p>
-            <a:fld id="{241EB5C9-1307-BA42-ABA2-0BC069CD8E7F}" type="datetimeFigureOut">
-              <a:rPr lang="en-US" smtClean="0"/>
-              <a:t>10/27/22</a:t>
-            </a:fld>
+            <a:r>
+              <a:rPr lang="fr-FR"/>
+              <a:t>03/11/2022</a:t>
+            </a:r>
             <a:endParaRPr lang="en-US"/>
           </a:p>
         </p:txBody>
@@ -1186,7 +2851,7 @@
 </p:sldLayout>
 </file>
 
-<file path=ppt/slideLayouts/slideLayout4.xml><?xml version="1.0" encoding="utf-8"?>
+<file path=ppt/slideLayouts/slideLayout7.xml><?xml version="1.0" encoding="utf-8"?>
 <p:sldLayout xmlns:a="http://schemas.openxmlformats.org/drawingml/2006/main" xmlns:r="http://schemas.openxmlformats.org/officeDocument/2006/relationships" xmlns:p="http://schemas.openxmlformats.org/presentationml/2006/main" type="twoObj" preserve="1">
   <p:cSld name="Two Content">
     <p:spTree>
@@ -1408,10 +3073,10 @@
           <a:bodyPr/>
           <a:lstStyle/>
           <a:p>
-            <a:fld id="{241EB5C9-1307-BA42-ABA2-0BC069CD8E7F}" type="datetimeFigureOut">
-              <a:rPr lang="en-US" smtClean="0"/>
-              <a:t>10/27/22</a:t>
-            </a:fld>
+            <a:r>
+              <a:rPr lang="fr-FR"/>
+              <a:t>03/11/2022</a:t>
+            </a:r>
             <a:endParaRPr lang="en-US"/>
           </a:p>
         </p:txBody>
@@ -1471,426 +3136,7 @@
 </p:sldLayout>
 </file>
 
-<file path=ppt/slideLayouts/slideLayout5.xml><?xml version="1.0" encoding="utf-8"?>
-<p:sldLayout xmlns:a="http://schemas.openxmlformats.org/drawingml/2006/main" xmlns:r="http://schemas.openxmlformats.org/officeDocument/2006/relationships" xmlns:p="http://schemas.openxmlformats.org/presentationml/2006/main" type="twoTxTwoObj" preserve="1">
-  <p:cSld name="Comparison">
-    <p:spTree>
-      <p:nvGrpSpPr>
-        <p:cNvPr id="1" name=""/>
-        <p:cNvGrpSpPr/>
-        <p:nvPr/>
-      </p:nvGrpSpPr>
-      <p:grpSpPr>
-        <a:xfrm>
-          <a:off x="0" y="0"/>
-          <a:ext cx="0" cy="0"/>
-          <a:chOff x="0" y="0"/>
-          <a:chExt cx="0" cy="0"/>
-        </a:xfrm>
-      </p:grpSpPr>
-      <p:sp>
-        <p:nvSpPr>
-          <p:cNvPr id="2" name="Title 1"/>
-          <p:cNvSpPr>
-            <a:spLocks noGrp="1"/>
-          </p:cNvSpPr>
-          <p:nvPr>
-            <p:ph type="title"/>
-          </p:nvPr>
-        </p:nvSpPr>
-        <p:spPr/>
-        <p:txBody>
-          <a:bodyPr/>
-          <a:lstStyle>
-            <a:lvl1pPr>
-              <a:defRPr/>
-            </a:lvl1pPr>
-          </a:lstStyle>
-          <a:p>
-            <a:r>
-              <a:rPr lang="en-US"/>
-              <a:t>Click to edit Master title style</a:t>
-            </a:r>
-          </a:p>
-        </p:txBody>
-      </p:sp>
-      <p:sp>
-        <p:nvSpPr>
-          <p:cNvPr id="3" name="Text Placeholder 2"/>
-          <p:cNvSpPr>
-            <a:spLocks noGrp="1"/>
-          </p:cNvSpPr>
-          <p:nvPr>
-            <p:ph type="body" idx="1"/>
-          </p:nvPr>
-        </p:nvSpPr>
-        <p:spPr>
-          <a:xfrm>
-            <a:off x="457200" y="1151335"/>
-            <a:ext cx="4040188" cy="479822"/>
-          </a:xfrm>
-        </p:spPr>
-        <p:txBody>
-          <a:bodyPr anchor="b"/>
-          <a:lstStyle>
-            <a:lvl1pPr marL="0" indent="0">
-              <a:buNone/>
-              <a:defRPr sz="1800" b="1"/>
-            </a:lvl1pPr>
-            <a:lvl2pPr marL="342900" indent="0">
-              <a:buNone/>
-              <a:defRPr sz="1500" b="1"/>
-            </a:lvl2pPr>
-            <a:lvl3pPr marL="685800" indent="0">
-              <a:buNone/>
-              <a:defRPr sz="1350" b="1"/>
-            </a:lvl3pPr>
-            <a:lvl4pPr marL="1028700" indent="0">
-              <a:buNone/>
-              <a:defRPr sz="1200" b="1"/>
-            </a:lvl4pPr>
-            <a:lvl5pPr marL="1371600" indent="0">
-              <a:buNone/>
-              <a:defRPr sz="1200" b="1"/>
-            </a:lvl5pPr>
-            <a:lvl6pPr marL="1714500" indent="0">
-              <a:buNone/>
-              <a:defRPr sz="1200" b="1"/>
-            </a:lvl6pPr>
-            <a:lvl7pPr marL="2057400" indent="0">
-              <a:buNone/>
-              <a:defRPr sz="1200" b="1"/>
-            </a:lvl7pPr>
-            <a:lvl8pPr marL="2400300" indent="0">
-              <a:buNone/>
-              <a:defRPr sz="1200" b="1"/>
-            </a:lvl8pPr>
-            <a:lvl9pPr marL="2743200" indent="0">
-              <a:buNone/>
-              <a:defRPr sz="1200" b="1"/>
-            </a:lvl9pPr>
-          </a:lstStyle>
-          <a:p>
-            <a:pPr lvl="0"/>
-            <a:r>
-              <a:rPr lang="en-US"/>
-              <a:t>Click to edit Master text styles</a:t>
-            </a:r>
-          </a:p>
-        </p:txBody>
-      </p:sp>
-      <p:sp>
-        <p:nvSpPr>
-          <p:cNvPr id="4" name="Content Placeholder 3"/>
-          <p:cNvSpPr>
-            <a:spLocks noGrp="1"/>
-          </p:cNvSpPr>
-          <p:nvPr>
-            <p:ph sz="half" idx="2"/>
-          </p:nvPr>
-        </p:nvSpPr>
-        <p:spPr>
-          <a:xfrm>
-            <a:off x="457200" y="1631156"/>
-            <a:ext cx="4040188" cy="2963466"/>
-          </a:xfrm>
-        </p:spPr>
-        <p:txBody>
-          <a:bodyPr/>
-          <a:lstStyle>
-            <a:lvl1pPr>
-              <a:defRPr sz="1800"/>
-            </a:lvl1pPr>
-            <a:lvl2pPr>
-              <a:defRPr sz="1500"/>
-            </a:lvl2pPr>
-            <a:lvl3pPr>
-              <a:defRPr sz="1350"/>
-            </a:lvl3pPr>
-            <a:lvl4pPr>
-              <a:defRPr sz="1200"/>
-            </a:lvl4pPr>
-            <a:lvl5pPr>
-              <a:defRPr sz="1200"/>
-            </a:lvl5pPr>
-            <a:lvl6pPr>
-              <a:defRPr sz="1200"/>
-            </a:lvl6pPr>
-            <a:lvl7pPr>
-              <a:defRPr sz="1200"/>
-            </a:lvl7pPr>
-            <a:lvl8pPr>
-              <a:defRPr sz="1200"/>
-            </a:lvl8pPr>
-            <a:lvl9pPr>
-              <a:defRPr sz="1200"/>
-            </a:lvl9pPr>
-          </a:lstStyle>
-          <a:p>
-            <a:pPr lvl="0"/>
-            <a:r>
-              <a:rPr lang="en-US"/>
-              <a:t>Click to edit Master text styles</a:t>
-            </a:r>
-          </a:p>
-          <a:p>
-            <a:pPr lvl="1"/>
-            <a:r>
-              <a:rPr lang="en-US"/>
-              <a:t>Second level</a:t>
-            </a:r>
-          </a:p>
-          <a:p>
-            <a:pPr lvl="2"/>
-            <a:r>
-              <a:rPr lang="en-US"/>
-              <a:t>Third level</a:t>
-            </a:r>
-          </a:p>
-          <a:p>
-            <a:pPr lvl="3"/>
-            <a:r>
-              <a:rPr lang="en-US"/>
-              <a:t>Fourth level</a:t>
-            </a:r>
-          </a:p>
-          <a:p>
-            <a:pPr lvl="4"/>
-            <a:r>
-              <a:rPr lang="en-US"/>
-              <a:t>Fifth level</a:t>
-            </a:r>
-          </a:p>
-        </p:txBody>
-      </p:sp>
-      <p:sp>
-        <p:nvSpPr>
-          <p:cNvPr id="5" name="Text Placeholder 4"/>
-          <p:cNvSpPr>
-            <a:spLocks noGrp="1"/>
-          </p:cNvSpPr>
-          <p:nvPr>
-            <p:ph type="body" sz="quarter" idx="3"/>
-          </p:nvPr>
-        </p:nvSpPr>
-        <p:spPr>
-          <a:xfrm>
-            <a:off x="4645026" y="1151335"/>
-            <a:ext cx="4041775" cy="479822"/>
-          </a:xfrm>
-        </p:spPr>
-        <p:txBody>
-          <a:bodyPr anchor="b"/>
-          <a:lstStyle>
-            <a:lvl1pPr marL="0" indent="0">
-              <a:buNone/>
-              <a:defRPr sz="1800" b="1"/>
-            </a:lvl1pPr>
-            <a:lvl2pPr marL="342900" indent="0">
-              <a:buNone/>
-              <a:defRPr sz="1500" b="1"/>
-            </a:lvl2pPr>
-            <a:lvl3pPr marL="685800" indent="0">
-              <a:buNone/>
-              <a:defRPr sz="1350" b="1"/>
-            </a:lvl3pPr>
-            <a:lvl4pPr marL="1028700" indent="0">
-              <a:buNone/>
-              <a:defRPr sz="1200" b="1"/>
-            </a:lvl4pPr>
-            <a:lvl5pPr marL="1371600" indent="0">
-              <a:buNone/>
-              <a:defRPr sz="1200" b="1"/>
-            </a:lvl5pPr>
-            <a:lvl6pPr marL="1714500" indent="0">
-              <a:buNone/>
-              <a:defRPr sz="1200" b="1"/>
-            </a:lvl6pPr>
-            <a:lvl7pPr marL="2057400" indent="0">
-              <a:buNone/>
-              <a:defRPr sz="1200" b="1"/>
-            </a:lvl7pPr>
-            <a:lvl8pPr marL="2400300" indent="0">
-              <a:buNone/>
-              <a:defRPr sz="1200" b="1"/>
-            </a:lvl8pPr>
-            <a:lvl9pPr marL="2743200" indent="0">
-              <a:buNone/>
-              <a:defRPr sz="1200" b="1"/>
-            </a:lvl9pPr>
-          </a:lstStyle>
-          <a:p>
-            <a:pPr lvl="0"/>
-            <a:r>
-              <a:rPr lang="en-US"/>
-              <a:t>Click to edit Master text styles</a:t>
-            </a:r>
-          </a:p>
-        </p:txBody>
-      </p:sp>
-      <p:sp>
-        <p:nvSpPr>
-          <p:cNvPr id="6" name="Content Placeholder 5"/>
-          <p:cNvSpPr>
-            <a:spLocks noGrp="1"/>
-          </p:cNvSpPr>
-          <p:nvPr>
-            <p:ph sz="quarter" idx="4"/>
-          </p:nvPr>
-        </p:nvSpPr>
-        <p:spPr>
-          <a:xfrm>
-            <a:off x="4645026" y="1631156"/>
-            <a:ext cx="4041775" cy="2963466"/>
-          </a:xfrm>
-        </p:spPr>
-        <p:txBody>
-          <a:bodyPr/>
-          <a:lstStyle>
-            <a:lvl1pPr>
-              <a:defRPr sz="1800"/>
-            </a:lvl1pPr>
-            <a:lvl2pPr>
-              <a:defRPr sz="1500"/>
-            </a:lvl2pPr>
-            <a:lvl3pPr>
-              <a:defRPr sz="1350"/>
-            </a:lvl3pPr>
-            <a:lvl4pPr>
-              <a:defRPr sz="1200"/>
-            </a:lvl4pPr>
-            <a:lvl5pPr>
-              <a:defRPr sz="1200"/>
-            </a:lvl5pPr>
-            <a:lvl6pPr>
-              <a:defRPr sz="1200"/>
-            </a:lvl6pPr>
-            <a:lvl7pPr>
-              <a:defRPr sz="1200"/>
-            </a:lvl7pPr>
-            <a:lvl8pPr>
-              <a:defRPr sz="1200"/>
-            </a:lvl8pPr>
-            <a:lvl9pPr>
-              <a:defRPr sz="1200"/>
-            </a:lvl9pPr>
-          </a:lstStyle>
-          <a:p>
-            <a:pPr lvl="0"/>
-            <a:r>
-              <a:rPr lang="en-US"/>
-              <a:t>Click to edit Master text styles</a:t>
-            </a:r>
-          </a:p>
-          <a:p>
-            <a:pPr lvl="1"/>
-            <a:r>
-              <a:rPr lang="en-US"/>
-              <a:t>Second level</a:t>
-            </a:r>
-          </a:p>
-          <a:p>
-            <a:pPr lvl="2"/>
-            <a:r>
-              <a:rPr lang="en-US"/>
-              <a:t>Third level</a:t>
-            </a:r>
-          </a:p>
-          <a:p>
-            <a:pPr lvl="3"/>
-            <a:r>
-              <a:rPr lang="en-US"/>
-              <a:t>Fourth level</a:t>
-            </a:r>
-          </a:p>
-          <a:p>
-            <a:pPr lvl="4"/>
-            <a:r>
-              <a:rPr lang="en-US"/>
-              <a:t>Fifth level</a:t>
-            </a:r>
-          </a:p>
-        </p:txBody>
-      </p:sp>
-      <p:sp>
-        <p:nvSpPr>
-          <p:cNvPr id="7" name="Date Placeholder 6"/>
-          <p:cNvSpPr>
-            <a:spLocks noGrp="1"/>
-          </p:cNvSpPr>
-          <p:nvPr>
-            <p:ph type="dt" sz="half" idx="10"/>
-          </p:nvPr>
-        </p:nvSpPr>
-        <p:spPr/>
-        <p:txBody>
-          <a:bodyPr/>
-          <a:lstStyle/>
-          <a:p>
-            <a:fld id="{241EB5C9-1307-BA42-ABA2-0BC069CD8E7F}" type="datetimeFigureOut">
-              <a:rPr lang="en-US" smtClean="0"/>
-              <a:t>10/27/22</a:t>
-            </a:fld>
-            <a:endParaRPr lang="en-US"/>
-          </a:p>
-        </p:txBody>
-      </p:sp>
-      <p:sp>
-        <p:nvSpPr>
-          <p:cNvPr id="8" name="Footer Placeholder 7"/>
-          <p:cNvSpPr>
-            <a:spLocks noGrp="1"/>
-          </p:cNvSpPr>
-          <p:nvPr>
-            <p:ph type="ftr" sz="quarter" idx="11"/>
-          </p:nvPr>
-        </p:nvSpPr>
-        <p:spPr/>
-        <p:txBody>
-          <a:bodyPr/>
-          <a:lstStyle/>
-          <a:p>
-            <a:endParaRPr lang="en-US"/>
-          </a:p>
-        </p:txBody>
-      </p:sp>
-      <p:sp>
-        <p:nvSpPr>
-          <p:cNvPr id="9" name="Slide Number Placeholder 8"/>
-          <p:cNvSpPr>
-            <a:spLocks noGrp="1"/>
-          </p:cNvSpPr>
-          <p:nvPr>
-            <p:ph type="sldNum" sz="quarter" idx="12"/>
-          </p:nvPr>
-        </p:nvSpPr>
-        <p:spPr/>
-        <p:txBody>
-          <a:bodyPr/>
-          <a:lstStyle/>
-          <a:p>
-            <a:fld id="{C5EF2332-01BF-834F-8236-50238282D533}" type="slidenum">
-              <a:rPr lang="en-US" smtClean="0"/>
-              <a:t>‹N°›</a:t>
-            </a:fld>
-            <a:endParaRPr lang="en-US"/>
-          </a:p>
-        </p:txBody>
-      </p:sp>
-    </p:spTree>
-    <p:extLst>
-      <p:ext uri="{BB962C8B-B14F-4D97-AF65-F5344CB8AC3E}">
-        <p14:creationId xmlns:p14="http://schemas.microsoft.com/office/powerpoint/2010/main" val="2535793967"/>
-      </p:ext>
-    </p:extLst>
-  </p:cSld>
-  <p:clrMapOvr>
-    <a:masterClrMapping/>
-  </p:clrMapOvr>
-</p:sldLayout>
-</file>
-
-<file path=ppt/slideLayouts/slideLayout6.xml><?xml version="1.0" encoding="utf-8"?>
+<file path=ppt/slideLayouts/slideLayout8.xml><?xml version="1.0" encoding="utf-8"?>
 <p:sldLayout xmlns:a="http://schemas.openxmlformats.org/drawingml/2006/main" xmlns:r="http://schemas.openxmlformats.org/officeDocument/2006/relationships" xmlns:p="http://schemas.openxmlformats.org/presentationml/2006/main" type="titleOnly" preserve="1">
   <p:cSld name="Title Only">
     <p:spTree>
@@ -1944,10 +3190,10 @@
           <a:bodyPr/>
           <a:lstStyle/>
           <a:p>
-            <a:fld id="{241EB5C9-1307-BA42-ABA2-0BC069CD8E7F}" type="datetimeFigureOut">
-              <a:rPr lang="en-US" smtClean="0"/>
-              <a:t>10/27/22</a:t>
-            </a:fld>
+            <a:r>
+              <a:rPr lang="fr-FR"/>
+              <a:t>03/11/2022</a:t>
+            </a:r>
             <a:endParaRPr lang="en-US"/>
           </a:p>
         </p:txBody>
@@ -2007,7 +3253,7 @@
 </p:sldLayout>
 </file>
 
-<file path=ppt/slideLayouts/slideLayout7.xml><?xml version="1.0" encoding="utf-8"?>
+<file path=ppt/slideLayouts/slideLayout9.xml><?xml version="1.0" encoding="utf-8"?>
 <p:sldLayout xmlns:a="http://schemas.openxmlformats.org/drawingml/2006/main" xmlns:r="http://schemas.openxmlformats.org/officeDocument/2006/relationships" xmlns:p="http://schemas.openxmlformats.org/presentationml/2006/main" type="blank" preserve="1">
   <p:cSld name="Blank">
     <p:spTree>
@@ -2039,10 +3285,10 @@
           <a:bodyPr/>
           <a:lstStyle/>
           <a:p>
-            <a:fld id="{241EB5C9-1307-BA42-ABA2-0BC069CD8E7F}" type="datetimeFigureOut">
-              <a:rPr lang="en-US" smtClean="0"/>
-              <a:t>10/27/22</a:t>
-            </a:fld>
+            <a:r>
+              <a:rPr lang="fr-FR"/>
+              <a:t>03/11/2022</a:t>
+            </a:r>
             <a:endParaRPr lang="en-US"/>
           </a:p>
         </p:txBody>
@@ -2093,533 +3339,6 @@
     <p:extLst>
       <p:ext uri="{BB962C8B-B14F-4D97-AF65-F5344CB8AC3E}">
         <p14:creationId xmlns:p14="http://schemas.microsoft.com/office/powerpoint/2010/main" val="2130901097"/>
-      </p:ext>
-    </p:extLst>
-  </p:cSld>
-  <p:clrMapOvr>
-    <a:masterClrMapping/>
-  </p:clrMapOvr>
-</p:sldLayout>
-</file>
-
-<file path=ppt/slideLayouts/slideLayout8.xml><?xml version="1.0" encoding="utf-8"?>
-<p:sldLayout xmlns:a="http://schemas.openxmlformats.org/drawingml/2006/main" xmlns:r="http://schemas.openxmlformats.org/officeDocument/2006/relationships" xmlns:p="http://schemas.openxmlformats.org/presentationml/2006/main" type="objTx" preserve="1">
-  <p:cSld name="Content with Caption">
-    <p:spTree>
-      <p:nvGrpSpPr>
-        <p:cNvPr id="1" name=""/>
-        <p:cNvGrpSpPr/>
-        <p:nvPr/>
-      </p:nvGrpSpPr>
-      <p:grpSpPr>
-        <a:xfrm>
-          <a:off x="0" y="0"/>
-          <a:ext cx="0" cy="0"/>
-          <a:chOff x="0" y="0"/>
-          <a:chExt cx="0" cy="0"/>
-        </a:xfrm>
-      </p:grpSpPr>
-      <p:sp>
-        <p:nvSpPr>
-          <p:cNvPr id="2" name="Title 1"/>
-          <p:cNvSpPr>
-            <a:spLocks noGrp="1"/>
-          </p:cNvSpPr>
-          <p:nvPr>
-            <p:ph type="title"/>
-          </p:nvPr>
-        </p:nvSpPr>
-        <p:spPr>
-          <a:xfrm>
-            <a:off x="457201" y="204787"/>
-            <a:ext cx="3008313" cy="871538"/>
-          </a:xfrm>
-        </p:spPr>
-        <p:txBody>
-          <a:bodyPr anchor="b"/>
-          <a:lstStyle>
-            <a:lvl1pPr algn="l">
-              <a:defRPr sz="1500" b="1"/>
-            </a:lvl1pPr>
-          </a:lstStyle>
-          <a:p>
-            <a:r>
-              <a:rPr lang="en-US"/>
-              <a:t>Click to edit Master title style</a:t>
-            </a:r>
-          </a:p>
-        </p:txBody>
-      </p:sp>
-      <p:sp>
-        <p:nvSpPr>
-          <p:cNvPr id="3" name="Content Placeholder 2"/>
-          <p:cNvSpPr>
-            <a:spLocks noGrp="1"/>
-          </p:cNvSpPr>
-          <p:nvPr>
-            <p:ph idx="1"/>
-          </p:nvPr>
-        </p:nvSpPr>
-        <p:spPr>
-          <a:xfrm>
-            <a:off x="3575050" y="204788"/>
-            <a:ext cx="5111750" cy="4389835"/>
-          </a:xfrm>
-        </p:spPr>
-        <p:txBody>
-          <a:bodyPr/>
-          <a:lstStyle>
-            <a:lvl1pPr>
-              <a:defRPr sz="2400"/>
-            </a:lvl1pPr>
-            <a:lvl2pPr>
-              <a:defRPr sz="2100"/>
-            </a:lvl2pPr>
-            <a:lvl3pPr>
-              <a:defRPr sz="1800"/>
-            </a:lvl3pPr>
-            <a:lvl4pPr>
-              <a:defRPr sz="1500"/>
-            </a:lvl4pPr>
-            <a:lvl5pPr>
-              <a:defRPr sz="1500"/>
-            </a:lvl5pPr>
-            <a:lvl6pPr>
-              <a:defRPr sz="1500"/>
-            </a:lvl6pPr>
-            <a:lvl7pPr>
-              <a:defRPr sz="1500"/>
-            </a:lvl7pPr>
-            <a:lvl8pPr>
-              <a:defRPr sz="1500"/>
-            </a:lvl8pPr>
-            <a:lvl9pPr>
-              <a:defRPr sz="1500"/>
-            </a:lvl9pPr>
-          </a:lstStyle>
-          <a:p>
-            <a:pPr lvl="0"/>
-            <a:r>
-              <a:rPr lang="en-US"/>
-              <a:t>Click to edit Master text styles</a:t>
-            </a:r>
-          </a:p>
-          <a:p>
-            <a:pPr lvl="1"/>
-            <a:r>
-              <a:rPr lang="en-US"/>
-              <a:t>Second level</a:t>
-            </a:r>
-          </a:p>
-          <a:p>
-            <a:pPr lvl="2"/>
-            <a:r>
-              <a:rPr lang="en-US"/>
-              <a:t>Third level</a:t>
-            </a:r>
-          </a:p>
-          <a:p>
-            <a:pPr lvl="3"/>
-            <a:r>
-              <a:rPr lang="en-US"/>
-              <a:t>Fourth level</a:t>
-            </a:r>
-          </a:p>
-          <a:p>
-            <a:pPr lvl="4"/>
-            <a:r>
-              <a:rPr lang="en-US"/>
-              <a:t>Fifth level</a:t>
-            </a:r>
-          </a:p>
-        </p:txBody>
-      </p:sp>
-      <p:sp>
-        <p:nvSpPr>
-          <p:cNvPr id="4" name="Text Placeholder 3"/>
-          <p:cNvSpPr>
-            <a:spLocks noGrp="1"/>
-          </p:cNvSpPr>
-          <p:nvPr>
-            <p:ph type="body" sz="half" idx="2"/>
-          </p:nvPr>
-        </p:nvSpPr>
-        <p:spPr>
-          <a:xfrm>
-            <a:off x="457201" y="1076326"/>
-            <a:ext cx="3008313" cy="3518297"/>
-          </a:xfrm>
-        </p:spPr>
-        <p:txBody>
-          <a:bodyPr/>
-          <a:lstStyle>
-            <a:lvl1pPr marL="0" indent="0">
-              <a:buNone/>
-              <a:defRPr sz="1050"/>
-            </a:lvl1pPr>
-            <a:lvl2pPr marL="342900" indent="0">
-              <a:buNone/>
-              <a:defRPr sz="900"/>
-            </a:lvl2pPr>
-            <a:lvl3pPr marL="685800" indent="0">
-              <a:buNone/>
-              <a:defRPr sz="750"/>
-            </a:lvl3pPr>
-            <a:lvl4pPr marL="1028700" indent="0">
-              <a:buNone/>
-              <a:defRPr sz="675"/>
-            </a:lvl4pPr>
-            <a:lvl5pPr marL="1371600" indent="0">
-              <a:buNone/>
-              <a:defRPr sz="675"/>
-            </a:lvl5pPr>
-            <a:lvl6pPr marL="1714500" indent="0">
-              <a:buNone/>
-              <a:defRPr sz="675"/>
-            </a:lvl6pPr>
-            <a:lvl7pPr marL="2057400" indent="0">
-              <a:buNone/>
-              <a:defRPr sz="675"/>
-            </a:lvl7pPr>
-            <a:lvl8pPr marL="2400300" indent="0">
-              <a:buNone/>
-              <a:defRPr sz="675"/>
-            </a:lvl8pPr>
-            <a:lvl9pPr marL="2743200" indent="0">
-              <a:buNone/>
-              <a:defRPr sz="675"/>
-            </a:lvl9pPr>
-          </a:lstStyle>
-          <a:p>
-            <a:pPr lvl="0"/>
-            <a:r>
-              <a:rPr lang="en-US"/>
-              <a:t>Click to edit Master text styles</a:t>
-            </a:r>
-          </a:p>
-        </p:txBody>
-      </p:sp>
-      <p:sp>
-        <p:nvSpPr>
-          <p:cNvPr id="5" name="Date Placeholder 4"/>
-          <p:cNvSpPr>
-            <a:spLocks noGrp="1"/>
-          </p:cNvSpPr>
-          <p:nvPr>
-            <p:ph type="dt" sz="half" idx="10"/>
-          </p:nvPr>
-        </p:nvSpPr>
-        <p:spPr/>
-        <p:txBody>
-          <a:bodyPr/>
-          <a:lstStyle/>
-          <a:p>
-            <a:fld id="{241EB5C9-1307-BA42-ABA2-0BC069CD8E7F}" type="datetimeFigureOut">
-              <a:rPr lang="en-US" smtClean="0"/>
-              <a:t>10/27/22</a:t>
-            </a:fld>
-            <a:endParaRPr lang="en-US"/>
-          </a:p>
-        </p:txBody>
-      </p:sp>
-      <p:sp>
-        <p:nvSpPr>
-          <p:cNvPr id="6" name="Footer Placeholder 5"/>
-          <p:cNvSpPr>
-            <a:spLocks noGrp="1"/>
-          </p:cNvSpPr>
-          <p:nvPr>
-            <p:ph type="ftr" sz="quarter" idx="11"/>
-          </p:nvPr>
-        </p:nvSpPr>
-        <p:spPr/>
-        <p:txBody>
-          <a:bodyPr/>
-          <a:lstStyle/>
-          <a:p>
-            <a:endParaRPr lang="en-US"/>
-          </a:p>
-        </p:txBody>
-      </p:sp>
-      <p:sp>
-        <p:nvSpPr>
-          <p:cNvPr id="7" name="Slide Number Placeholder 6"/>
-          <p:cNvSpPr>
-            <a:spLocks noGrp="1"/>
-          </p:cNvSpPr>
-          <p:nvPr>
-            <p:ph type="sldNum" sz="quarter" idx="12"/>
-          </p:nvPr>
-        </p:nvSpPr>
-        <p:spPr/>
-        <p:txBody>
-          <a:bodyPr/>
-          <a:lstStyle/>
-          <a:p>
-            <a:fld id="{C5EF2332-01BF-834F-8236-50238282D533}" type="slidenum">
-              <a:rPr lang="en-US" smtClean="0"/>
-              <a:t>‹N°›</a:t>
-            </a:fld>
-            <a:endParaRPr lang="en-US"/>
-          </a:p>
-        </p:txBody>
-      </p:sp>
-    </p:spTree>
-    <p:extLst>
-      <p:ext uri="{BB962C8B-B14F-4D97-AF65-F5344CB8AC3E}">
-        <p14:creationId xmlns:p14="http://schemas.microsoft.com/office/powerpoint/2010/main" val="3540895647"/>
-      </p:ext>
-    </p:extLst>
-  </p:cSld>
-  <p:clrMapOvr>
-    <a:masterClrMapping/>
-  </p:clrMapOvr>
-</p:sldLayout>
-</file>
-
-<file path=ppt/slideLayouts/slideLayout9.xml><?xml version="1.0" encoding="utf-8"?>
-<p:sldLayout xmlns:a="http://schemas.openxmlformats.org/drawingml/2006/main" xmlns:r="http://schemas.openxmlformats.org/officeDocument/2006/relationships" xmlns:p="http://schemas.openxmlformats.org/presentationml/2006/main" type="picTx" preserve="1">
-  <p:cSld name="Picture with Caption">
-    <p:spTree>
-      <p:nvGrpSpPr>
-        <p:cNvPr id="1" name=""/>
-        <p:cNvGrpSpPr/>
-        <p:nvPr/>
-      </p:nvGrpSpPr>
-      <p:grpSpPr>
-        <a:xfrm>
-          <a:off x="0" y="0"/>
-          <a:ext cx="0" cy="0"/>
-          <a:chOff x="0" y="0"/>
-          <a:chExt cx="0" cy="0"/>
-        </a:xfrm>
-      </p:grpSpPr>
-      <p:sp>
-        <p:nvSpPr>
-          <p:cNvPr id="2" name="Title 1"/>
-          <p:cNvSpPr>
-            <a:spLocks noGrp="1"/>
-          </p:cNvSpPr>
-          <p:nvPr>
-            <p:ph type="title"/>
-          </p:nvPr>
-        </p:nvSpPr>
-        <p:spPr>
-          <a:xfrm>
-            <a:off x="1792288" y="3600450"/>
-            <a:ext cx="5486400" cy="425054"/>
-          </a:xfrm>
-        </p:spPr>
-        <p:txBody>
-          <a:bodyPr anchor="b"/>
-          <a:lstStyle>
-            <a:lvl1pPr algn="l">
-              <a:defRPr sz="1500" b="1"/>
-            </a:lvl1pPr>
-          </a:lstStyle>
-          <a:p>
-            <a:r>
-              <a:rPr lang="en-US"/>
-              <a:t>Click to edit Master title style</a:t>
-            </a:r>
-          </a:p>
-        </p:txBody>
-      </p:sp>
-      <p:sp>
-        <p:nvSpPr>
-          <p:cNvPr id="3" name="Picture Placeholder 2"/>
-          <p:cNvSpPr>
-            <a:spLocks noGrp="1"/>
-          </p:cNvSpPr>
-          <p:nvPr>
-            <p:ph type="pic" idx="1"/>
-          </p:nvPr>
-        </p:nvSpPr>
-        <p:spPr>
-          <a:xfrm>
-            <a:off x="1792288" y="459581"/>
-            <a:ext cx="5486400" cy="3086100"/>
-          </a:xfrm>
-        </p:spPr>
-        <p:txBody>
-          <a:bodyPr/>
-          <a:lstStyle>
-            <a:lvl1pPr marL="0" indent="0">
-              <a:buNone/>
-              <a:defRPr sz="2400"/>
-            </a:lvl1pPr>
-            <a:lvl2pPr marL="342900" indent="0">
-              <a:buNone/>
-              <a:defRPr sz="2100"/>
-            </a:lvl2pPr>
-            <a:lvl3pPr marL="685800" indent="0">
-              <a:buNone/>
-              <a:defRPr sz="1800"/>
-            </a:lvl3pPr>
-            <a:lvl4pPr marL="1028700" indent="0">
-              <a:buNone/>
-              <a:defRPr sz="1500"/>
-            </a:lvl4pPr>
-            <a:lvl5pPr marL="1371600" indent="0">
-              <a:buNone/>
-              <a:defRPr sz="1500"/>
-            </a:lvl5pPr>
-            <a:lvl6pPr marL="1714500" indent="0">
-              <a:buNone/>
-              <a:defRPr sz="1500"/>
-            </a:lvl6pPr>
-            <a:lvl7pPr marL="2057400" indent="0">
-              <a:buNone/>
-              <a:defRPr sz="1500"/>
-            </a:lvl7pPr>
-            <a:lvl8pPr marL="2400300" indent="0">
-              <a:buNone/>
-              <a:defRPr sz="1500"/>
-            </a:lvl8pPr>
-            <a:lvl9pPr marL="2743200" indent="0">
-              <a:buNone/>
-              <a:defRPr sz="1500"/>
-            </a:lvl9pPr>
-          </a:lstStyle>
-          <a:p>
-            <a:endParaRPr lang="en-US"/>
-          </a:p>
-        </p:txBody>
-      </p:sp>
-      <p:sp>
-        <p:nvSpPr>
-          <p:cNvPr id="4" name="Text Placeholder 3"/>
-          <p:cNvSpPr>
-            <a:spLocks noGrp="1"/>
-          </p:cNvSpPr>
-          <p:nvPr>
-            <p:ph type="body" sz="half" idx="2"/>
-          </p:nvPr>
-        </p:nvSpPr>
-        <p:spPr>
-          <a:xfrm>
-            <a:off x="1792288" y="4025503"/>
-            <a:ext cx="5486400" cy="603647"/>
-          </a:xfrm>
-        </p:spPr>
-        <p:txBody>
-          <a:bodyPr/>
-          <a:lstStyle>
-            <a:lvl1pPr marL="0" indent="0">
-              <a:buNone/>
-              <a:defRPr sz="1050"/>
-            </a:lvl1pPr>
-            <a:lvl2pPr marL="342900" indent="0">
-              <a:buNone/>
-              <a:defRPr sz="900"/>
-            </a:lvl2pPr>
-            <a:lvl3pPr marL="685800" indent="0">
-              <a:buNone/>
-              <a:defRPr sz="750"/>
-            </a:lvl3pPr>
-            <a:lvl4pPr marL="1028700" indent="0">
-              <a:buNone/>
-              <a:defRPr sz="675"/>
-            </a:lvl4pPr>
-            <a:lvl5pPr marL="1371600" indent="0">
-              <a:buNone/>
-              <a:defRPr sz="675"/>
-            </a:lvl5pPr>
-            <a:lvl6pPr marL="1714500" indent="0">
-              <a:buNone/>
-              <a:defRPr sz="675"/>
-            </a:lvl6pPr>
-            <a:lvl7pPr marL="2057400" indent="0">
-              <a:buNone/>
-              <a:defRPr sz="675"/>
-            </a:lvl7pPr>
-            <a:lvl8pPr marL="2400300" indent="0">
-              <a:buNone/>
-              <a:defRPr sz="675"/>
-            </a:lvl8pPr>
-            <a:lvl9pPr marL="2743200" indent="0">
-              <a:buNone/>
-              <a:defRPr sz="675"/>
-            </a:lvl9pPr>
-          </a:lstStyle>
-          <a:p>
-            <a:pPr lvl="0"/>
-            <a:r>
-              <a:rPr lang="en-US"/>
-              <a:t>Click to edit Master text styles</a:t>
-            </a:r>
-          </a:p>
-        </p:txBody>
-      </p:sp>
-      <p:sp>
-        <p:nvSpPr>
-          <p:cNvPr id="5" name="Date Placeholder 4"/>
-          <p:cNvSpPr>
-            <a:spLocks noGrp="1"/>
-          </p:cNvSpPr>
-          <p:nvPr>
-            <p:ph type="dt" sz="half" idx="10"/>
-          </p:nvPr>
-        </p:nvSpPr>
-        <p:spPr/>
-        <p:txBody>
-          <a:bodyPr/>
-          <a:lstStyle/>
-          <a:p>
-            <a:fld id="{241EB5C9-1307-BA42-ABA2-0BC069CD8E7F}" type="datetimeFigureOut">
-              <a:rPr lang="en-US" smtClean="0"/>
-              <a:t>10/27/22</a:t>
-            </a:fld>
-            <a:endParaRPr lang="en-US"/>
-          </a:p>
-        </p:txBody>
-      </p:sp>
-      <p:sp>
-        <p:nvSpPr>
-          <p:cNvPr id="6" name="Footer Placeholder 5"/>
-          <p:cNvSpPr>
-            <a:spLocks noGrp="1"/>
-          </p:cNvSpPr>
-          <p:nvPr>
-            <p:ph type="ftr" sz="quarter" idx="11"/>
-          </p:nvPr>
-        </p:nvSpPr>
-        <p:spPr/>
-        <p:txBody>
-          <a:bodyPr/>
-          <a:lstStyle/>
-          <a:p>
-            <a:endParaRPr lang="en-US"/>
-          </a:p>
-        </p:txBody>
-      </p:sp>
-      <p:sp>
-        <p:nvSpPr>
-          <p:cNvPr id="7" name="Slide Number Placeholder 6"/>
-          <p:cNvSpPr>
-            <a:spLocks noGrp="1"/>
-          </p:cNvSpPr>
-          <p:nvPr>
-            <p:ph type="sldNum" sz="quarter" idx="12"/>
-          </p:nvPr>
-        </p:nvSpPr>
-        <p:spPr/>
-        <p:txBody>
-          <a:bodyPr/>
-          <a:lstStyle/>
-          <a:p>
-            <a:fld id="{C5EF2332-01BF-834F-8236-50238282D533}" type="slidenum">
-              <a:rPr lang="en-US" smtClean="0"/>
-              <a:t>‹N°›</a:t>
-            </a:fld>
-            <a:endParaRPr lang="en-US"/>
-          </a:p>
-        </p:txBody>
-      </p:sp>
-    </p:spTree>
-    <p:extLst>
-      <p:ext uri="{BB962C8B-B14F-4D97-AF65-F5344CB8AC3E}">
-        <p14:creationId xmlns:p14="http://schemas.microsoft.com/office/powerpoint/2010/main" val="3566899855"/>
       </p:ext>
     </p:extLst>
   </p:cSld>
@@ -2843,12 +3562,10 @@
           </a:lstStyle>
           <a:p>
             <a:pPr defTabSz="914400"/>
-            <a:fld id="{241EB5C9-1307-BA42-ABA2-0BC069CD8E7F}" type="datetimeFigureOut">
-              <a:rPr lang="fr-FR" smtClean="0"/>
-              <a:pPr defTabSz="914400"/>
-              <a:t>10/27/22</a:t>
-            </a:fld>
-            <a:endParaRPr lang="fr-FR"/>
+            <a:r>
+              <a:rPr lang="fr-FR"/>
+              <a:t>03/11/2022</a:t>
+            </a:r>
           </a:p>
         </p:txBody>
       </p:sp>
@@ -2944,7 +3661,7 @@
           <p:nvPr userDrawn="1"/>
         </p:nvPicPr>
         <p:blipFill>
-          <a:blip r:embed="rId13">
+          <a:blip r:embed="rId15">
             <a:extLst>
               <a:ext uri="{28A0092B-C50C-407E-A947-70E740481C1C}">
                 <a14:useLocalDpi xmlns:a14="http://schemas.microsoft.com/office/drawing/2010/main" val="0"/>
@@ -3138,18 +3855,21 @@
   </p:cSld>
   <p:clrMap bg1="lt1" tx1="dk1" bg2="lt2" tx2="dk2" accent1="accent1" accent2="accent2" accent3="accent3" accent4="accent4" accent5="accent5" accent6="accent6" hlink="hlink" folHlink="folHlink"/>
   <p:sldLayoutIdLst>
-    <p:sldLayoutId id="2147483649" r:id="rId1"/>
-    <p:sldLayoutId id="2147483650" r:id="rId2"/>
-    <p:sldLayoutId id="2147483651" r:id="rId3"/>
-    <p:sldLayoutId id="2147483652" r:id="rId4"/>
-    <p:sldLayoutId id="2147483653" r:id="rId5"/>
-    <p:sldLayoutId id="2147483654" r:id="rId6"/>
-    <p:sldLayoutId id="2147483655" r:id="rId7"/>
-    <p:sldLayoutId id="2147483656" r:id="rId8"/>
-    <p:sldLayoutId id="2147483657" r:id="rId9"/>
-    <p:sldLayoutId id="2147483658" r:id="rId10"/>
-    <p:sldLayoutId id="2147483659" r:id="rId11"/>
+    <p:sldLayoutId id="2147483660" r:id="rId1"/>
+    <p:sldLayoutId id="2147483649" r:id="rId2"/>
+    <p:sldLayoutId id="2147483661" r:id="rId3"/>
+    <p:sldLayoutId id="2147483650" r:id="rId4"/>
+    <p:sldLayoutId id="2147483662" r:id="rId5"/>
+    <p:sldLayoutId id="2147483651" r:id="rId6"/>
+    <p:sldLayoutId id="2147483652" r:id="rId7"/>
+    <p:sldLayoutId id="2147483654" r:id="rId8"/>
+    <p:sldLayoutId id="2147483655" r:id="rId9"/>
+    <p:sldLayoutId id="2147483656" r:id="rId10"/>
+    <p:sldLayoutId id="2147483657" r:id="rId11"/>
+    <p:sldLayoutId id="2147483658" r:id="rId12"/>
+    <p:sldLayoutId id="2147483659" r:id="rId13"/>
   </p:sldLayoutIdLst>
+  <p:hf hdr="0"/>
   <p:txStyles>
     <p:titleStyle>
       <a:lvl1pPr algn="l" defTabSz="342900" rtl="0" eaLnBrk="1" latinLnBrk="0" hangingPunct="1">
@@ -3430,12 +4150,7 @@
             <p:ph type="ctrTitle"/>
           </p:nvPr>
         </p:nvSpPr>
-        <p:spPr>
-          <a:xfrm>
-            <a:off x="685800" y="1597819"/>
-            <a:ext cx="7772400" cy="1102519"/>
-          </a:xfrm>
-        </p:spPr>
+        <p:spPr/>
         <p:txBody>
           <a:bodyPr/>
           <a:lstStyle/>
@@ -3459,12 +4174,7 @@
             <p:ph type="subTitle" idx="1"/>
           </p:nvPr>
         </p:nvSpPr>
-        <p:spPr>
-          <a:xfrm>
-            <a:off x="1371600" y="2914650"/>
-            <a:ext cx="6400800" cy="1314450"/>
-          </a:xfrm>
-        </p:spPr>
+        <p:spPr/>
         <p:txBody>
           <a:bodyPr/>
           <a:lstStyle/>
@@ -3485,7 +4195,13 @@
       </p:sp>
       <p:sp>
         <p:nvSpPr>
-          <p:cNvPr id="4" name="Date Placeholder 3"/>
+          <p:cNvPr id="5" name="Espace réservé de la date 4">
+            <a:extLst>
+              <a:ext uri="{FF2B5EF4-FFF2-40B4-BE49-F238E27FC236}">
+                <a16:creationId xmlns:a16="http://schemas.microsoft.com/office/drawing/2014/main" id="{E2CC7DBD-8C28-A103-04E0-28FEDDF9B6F8}"/>
+              </a:ext>
+            </a:extLst>
+          </p:cNvPr>
           <p:cNvSpPr>
             <a:spLocks noGrp="1"/>
           </p:cNvSpPr>
@@ -3498,12 +4214,40 @@
           <a:bodyPr/>
           <a:lstStyle/>
           <a:p>
-            <a:pPr marL="0" lvl="0" indent="0">
-              <a:buNone/>
-            </a:pPr>
-            <a:r>
-              <a:t>21/10/2022</a:t>
-            </a:r>
+            <a:r>
+              <a:rPr lang="fr-FR"/>
+              <a:t>03/11/2022</a:t>
+            </a:r>
+            <a:endParaRPr lang="en-US"/>
+          </a:p>
+        </p:txBody>
+      </p:sp>
+      <p:sp>
+        <p:nvSpPr>
+          <p:cNvPr id="7" name="Espace réservé du numéro de diapositive 6">
+            <a:extLst>
+              <a:ext uri="{FF2B5EF4-FFF2-40B4-BE49-F238E27FC236}">
+                <a16:creationId xmlns:a16="http://schemas.microsoft.com/office/drawing/2014/main" id="{7364E222-021C-CD13-D0E6-430CD417D2D1}"/>
+              </a:ext>
+            </a:extLst>
+          </p:cNvPr>
+          <p:cNvSpPr>
+            <a:spLocks noGrp="1"/>
+          </p:cNvSpPr>
+          <p:nvPr>
+            <p:ph type="sldNum" sz="quarter" idx="12"/>
+          </p:nvPr>
+        </p:nvSpPr>
+        <p:spPr/>
+        <p:txBody>
+          <a:bodyPr/>
+          <a:lstStyle/>
+          <a:p>
+            <a:fld id="{C5EF2332-01BF-834F-8236-50238282D533}" type="slidenum">
+              <a:rPr lang="en-US" smtClean="0"/>
+              <a:t>1</a:t>
+            </a:fld>
+            <a:endParaRPr lang="en-US"/>
           </a:p>
         </p:txBody>
       </p:sp>
@@ -3602,6 +4346,89 @@
           </a:p>
         </p:txBody>
       </p:sp>
+      <p:sp>
+        <p:nvSpPr>
+          <p:cNvPr id="4" name="Espace réservé du pied de page 3">
+            <a:extLst>
+              <a:ext uri="{FF2B5EF4-FFF2-40B4-BE49-F238E27FC236}">
+                <a16:creationId xmlns:a16="http://schemas.microsoft.com/office/drawing/2014/main" id="{B9E85F68-48C4-DD97-6ED7-AC66FDF13AAD}"/>
+              </a:ext>
+            </a:extLst>
+          </p:cNvPr>
+          <p:cNvSpPr>
+            <a:spLocks noGrp="1"/>
+          </p:cNvSpPr>
+          <p:nvPr>
+            <p:ph type="ftr" sz="quarter" idx="11"/>
+          </p:nvPr>
+        </p:nvSpPr>
+        <p:spPr/>
+        <p:txBody>
+          <a:bodyPr/>
+          <a:lstStyle/>
+          <a:p>
+            <a:endParaRPr lang="en-US"/>
+          </a:p>
+        </p:txBody>
+      </p:sp>
+      <p:sp>
+        <p:nvSpPr>
+          <p:cNvPr id="5" name="Espace réservé de la date 4">
+            <a:extLst>
+              <a:ext uri="{FF2B5EF4-FFF2-40B4-BE49-F238E27FC236}">
+                <a16:creationId xmlns:a16="http://schemas.microsoft.com/office/drawing/2014/main" id="{4D5BDFD5-5C26-52A1-DAF0-C131A80E4913}"/>
+              </a:ext>
+            </a:extLst>
+          </p:cNvPr>
+          <p:cNvSpPr>
+            <a:spLocks noGrp="1"/>
+          </p:cNvSpPr>
+          <p:nvPr>
+            <p:ph type="dt" sz="half" idx="10"/>
+          </p:nvPr>
+        </p:nvSpPr>
+        <p:spPr/>
+        <p:txBody>
+          <a:bodyPr/>
+          <a:lstStyle/>
+          <a:p>
+            <a:r>
+              <a:rPr lang="fr-FR"/>
+              <a:t>03/11/2022</a:t>
+            </a:r>
+            <a:endParaRPr lang="en-US"/>
+          </a:p>
+        </p:txBody>
+      </p:sp>
+      <p:sp>
+        <p:nvSpPr>
+          <p:cNvPr id="6" name="Espace réservé du numéro de diapositive 5">
+            <a:extLst>
+              <a:ext uri="{FF2B5EF4-FFF2-40B4-BE49-F238E27FC236}">
+                <a16:creationId xmlns:a16="http://schemas.microsoft.com/office/drawing/2014/main" id="{FD8235FA-B1EB-554A-49BC-0289DC5D1EC0}"/>
+              </a:ext>
+            </a:extLst>
+          </p:cNvPr>
+          <p:cNvSpPr>
+            <a:spLocks noGrp="1"/>
+          </p:cNvSpPr>
+          <p:nvPr>
+            <p:ph type="sldNum" sz="quarter" idx="12"/>
+          </p:nvPr>
+        </p:nvSpPr>
+        <p:spPr/>
+        <p:txBody>
+          <a:bodyPr/>
+          <a:lstStyle/>
+          <a:p>
+            <a:fld id="{C5EF2332-01BF-834F-8236-50238282D533}" type="slidenum">
+              <a:rPr lang="en-US" smtClean="0"/>
+              <a:t>2</a:t>
+            </a:fld>
+            <a:endParaRPr lang="en-US"/>
+          </a:p>
+        </p:txBody>
+      </p:sp>
     </p:spTree>
   </p:cSld>
   <p:clrMapOvr>
@@ -3697,6 +4524,89 @@
           </a:p>
         </p:txBody>
       </p:sp>
+      <p:sp>
+        <p:nvSpPr>
+          <p:cNvPr id="4" name="Espace réservé du pied de page 3">
+            <a:extLst>
+              <a:ext uri="{FF2B5EF4-FFF2-40B4-BE49-F238E27FC236}">
+                <a16:creationId xmlns:a16="http://schemas.microsoft.com/office/drawing/2014/main" id="{3D7392B6-E6BA-6F46-949B-215EF499F3C6}"/>
+              </a:ext>
+            </a:extLst>
+          </p:cNvPr>
+          <p:cNvSpPr>
+            <a:spLocks noGrp="1"/>
+          </p:cNvSpPr>
+          <p:nvPr>
+            <p:ph type="ftr" sz="quarter" idx="11"/>
+          </p:nvPr>
+        </p:nvSpPr>
+        <p:spPr/>
+        <p:txBody>
+          <a:bodyPr/>
+          <a:lstStyle/>
+          <a:p>
+            <a:endParaRPr lang="en-US"/>
+          </a:p>
+        </p:txBody>
+      </p:sp>
+      <p:sp>
+        <p:nvSpPr>
+          <p:cNvPr id="5" name="Espace réservé de la date 4">
+            <a:extLst>
+              <a:ext uri="{FF2B5EF4-FFF2-40B4-BE49-F238E27FC236}">
+                <a16:creationId xmlns:a16="http://schemas.microsoft.com/office/drawing/2014/main" id="{D7566213-30F7-F833-F58B-020BFF4377AE}"/>
+              </a:ext>
+            </a:extLst>
+          </p:cNvPr>
+          <p:cNvSpPr>
+            <a:spLocks noGrp="1"/>
+          </p:cNvSpPr>
+          <p:nvPr>
+            <p:ph type="dt" sz="half" idx="10"/>
+          </p:nvPr>
+        </p:nvSpPr>
+        <p:spPr/>
+        <p:txBody>
+          <a:bodyPr/>
+          <a:lstStyle/>
+          <a:p>
+            <a:r>
+              <a:rPr lang="fr-FR"/>
+              <a:t>03/11/2022</a:t>
+            </a:r>
+            <a:endParaRPr lang="en-US"/>
+          </a:p>
+        </p:txBody>
+      </p:sp>
+      <p:sp>
+        <p:nvSpPr>
+          <p:cNvPr id="6" name="Espace réservé du numéro de diapositive 5">
+            <a:extLst>
+              <a:ext uri="{FF2B5EF4-FFF2-40B4-BE49-F238E27FC236}">
+                <a16:creationId xmlns:a16="http://schemas.microsoft.com/office/drawing/2014/main" id="{60564648-5FAF-A532-0757-1684769A779B}"/>
+              </a:ext>
+            </a:extLst>
+          </p:cNvPr>
+          <p:cNvSpPr>
+            <a:spLocks noGrp="1"/>
+          </p:cNvSpPr>
+          <p:nvPr>
+            <p:ph type="sldNum" sz="quarter" idx="12"/>
+          </p:nvPr>
+        </p:nvSpPr>
+        <p:spPr/>
+        <p:txBody>
+          <a:bodyPr/>
+          <a:lstStyle/>
+          <a:p>
+            <a:fld id="{C5EF2332-01BF-834F-8236-50238282D533}" type="slidenum">
+              <a:rPr lang="en-US" smtClean="0"/>
+              <a:t>3</a:t>
+            </a:fld>
+            <a:endParaRPr lang="en-US"/>
+          </a:p>
+        </p:txBody>
+      </p:sp>
     </p:spTree>
   </p:cSld>
   <p:clrMapOvr>
@@ -3801,6 +4711,89 @@
             <a:r>
               <a:t>Texte de niveau 5</a:t>
             </a:r>
+          </a:p>
+        </p:txBody>
+      </p:sp>
+      <p:sp>
+        <p:nvSpPr>
+          <p:cNvPr id="4" name="Espace réservé du pied de page 3">
+            <a:extLst>
+              <a:ext uri="{FF2B5EF4-FFF2-40B4-BE49-F238E27FC236}">
+                <a16:creationId xmlns:a16="http://schemas.microsoft.com/office/drawing/2014/main" id="{50A22841-CFC8-54DE-43FA-7DC589DC43B5}"/>
+              </a:ext>
+            </a:extLst>
+          </p:cNvPr>
+          <p:cNvSpPr>
+            <a:spLocks noGrp="1"/>
+          </p:cNvSpPr>
+          <p:nvPr>
+            <p:ph type="ftr" sz="quarter" idx="11"/>
+          </p:nvPr>
+        </p:nvSpPr>
+        <p:spPr/>
+        <p:txBody>
+          <a:bodyPr/>
+          <a:lstStyle/>
+          <a:p>
+            <a:endParaRPr lang="en-US"/>
+          </a:p>
+        </p:txBody>
+      </p:sp>
+      <p:sp>
+        <p:nvSpPr>
+          <p:cNvPr id="5" name="Espace réservé de la date 4">
+            <a:extLst>
+              <a:ext uri="{FF2B5EF4-FFF2-40B4-BE49-F238E27FC236}">
+                <a16:creationId xmlns:a16="http://schemas.microsoft.com/office/drawing/2014/main" id="{EBB5D1E0-155C-1EDD-3F43-494D20C73829}"/>
+              </a:ext>
+            </a:extLst>
+          </p:cNvPr>
+          <p:cNvSpPr>
+            <a:spLocks noGrp="1"/>
+          </p:cNvSpPr>
+          <p:nvPr>
+            <p:ph type="dt" sz="half" idx="10"/>
+          </p:nvPr>
+        </p:nvSpPr>
+        <p:spPr/>
+        <p:txBody>
+          <a:bodyPr/>
+          <a:lstStyle/>
+          <a:p>
+            <a:r>
+              <a:rPr lang="fr-FR"/>
+              <a:t>03/11/2022</a:t>
+            </a:r>
+            <a:endParaRPr lang="en-US"/>
+          </a:p>
+        </p:txBody>
+      </p:sp>
+      <p:sp>
+        <p:nvSpPr>
+          <p:cNvPr id="6" name="Espace réservé du numéro de diapositive 5">
+            <a:extLst>
+              <a:ext uri="{FF2B5EF4-FFF2-40B4-BE49-F238E27FC236}">
+                <a16:creationId xmlns:a16="http://schemas.microsoft.com/office/drawing/2014/main" id="{3DD3B008-85B0-92A5-7D31-BEAFABAF3D8D}"/>
+              </a:ext>
+            </a:extLst>
+          </p:cNvPr>
+          <p:cNvSpPr>
+            <a:spLocks noGrp="1"/>
+          </p:cNvSpPr>
+          <p:nvPr>
+            <p:ph type="sldNum" sz="quarter" idx="12"/>
+          </p:nvPr>
+        </p:nvSpPr>
+        <p:spPr/>
+        <p:txBody>
+          <a:bodyPr/>
+          <a:lstStyle/>
+          <a:p>
+            <a:fld id="{C5EF2332-01BF-834F-8236-50238282D533}" type="slidenum">
+              <a:rPr lang="en-US" smtClean="0"/>
+              <a:t>4</a:t>
+            </a:fld>
+            <a:endParaRPr lang="en-US"/>
           </a:p>
         </p:txBody>
       </p:sp>
@@ -4130,4 +5123,299 @@
   </a:objectDefaults>
   <a:extraClrSchemeLst/>
 </a:theme>
+</file>
+
+<file path=ppt/theme/theme2.xml><?xml version="1.0" encoding="utf-8"?>
+<a:theme xmlns:a="http://schemas.openxmlformats.org/drawingml/2006/main" name="Thème Office">
+  <a:themeElements>
+    <a:clrScheme name="Office">
+      <a:dk1>
+        <a:sysClr val="windowText" lastClr="000000"/>
+      </a:dk1>
+      <a:lt1>
+        <a:sysClr val="window" lastClr="FFFFFF"/>
+      </a:lt1>
+      <a:dk2>
+        <a:srgbClr val="44546A"/>
+      </a:dk2>
+      <a:lt2>
+        <a:srgbClr val="E7E6E6"/>
+      </a:lt2>
+      <a:accent1>
+        <a:srgbClr val="4472C4"/>
+      </a:accent1>
+      <a:accent2>
+        <a:srgbClr val="ED7D31"/>
+      </a:accent2>
+      <a:accent3>
+        <a:srgbClr val="A5A5A5"/>
+      </a:accent3>
+      <a:accent4>
+        <a:srgbClr val="FFC000"/>
+      </a:accent4>
+      <a:accent5>
+        <a:srgbClr val="5B9BD5"/>
+      </a:accent5>
+      <a:accent6>
+        <a:srgbClr val="70AD47"/>
+      </a:accent6>
+      <a:hlink>
+        <a:srgbClr val="0563C1"/>
+      </a:hlink>
+      <a:folHlink>
+        <a:srgbClr val="954F72"/>
+      </a:folHlink>
+    </a:clrScheme>
+    <a:fontScheme name="Office">
+      <a:majorFont>
+        <a:latin typeface="Calibri Light" panose="020F0302020204030204"/>
+        <a:ea typeface=""/>
+        <a:cs typeface=""/>
+        <a:font script="Jpan" typeface="游ゴシック Light"/>
+        <a:font script="Hang" typeface="맑은 고딕"/>
+        <a:font script="Hans" typeface="等线 Light"/>
+        <a:font script="Hant" typeface="新細明體"/>
+        <a:font script="Arab" typeface="Times New Roman"/>
+        <a:font script="Hebr" typeface="Times New Roman"/>
+        <a:font script="Thai" typeface="Angsana New"/>
+        <a:font script="Ethi" typeface="Nyala"/>
+        <a:font script="Beng" typeface="Vrinda"/>
+        <a:font script="Gujr" typeface="Shruti"/>
+        <a:font script="Khmr" typeface="MoolBoran"/>
+        <a:font script="Knda" typeface="Tunga"/>
+        <a:font script="Guru" typeface="Raavi"/>
+        <a:font script="Cans" typeface="Euphemia"/>
+        <a:font script="Cher" typeface="Plantagenet Cherokee"/>
+        <a:font script="Yiii" typeface="Microsoft Yi Baiti"/>
+        <a:font script="Tibt" typeface="Microsoft Himalaya"/>
+        <a:font script="Thaa" typeface="MV Boli"/>
+        <a:font script="Deva" typeface="Mangal"/>
+        <a:font script="Telu" typeface="Gautami"/>
+        <a:font script="Taml" typeface="Latha"/>
+        <a:font script="Syrc" typeface="Estrangelo Edessa"/>
+        <a:font script="Orya" typeface="Kalinga"/>
+        <a:font script="Mlym" typeface="Kartika"/>
+        <a:font script="Laoo" typeface="DokChampa"/>
+        <a:font script="Sinh" typeface="Iskoola Pota"/>
+        <a:font script="Mong" typeface="Mongolian Baiti"/>
+        <a:font script="Viet" typeface="Times New Roman"/>
+        <a:font script="Uigh" typeface="Microsoft Uighur"/>
+        <a:font script="Geor" typeface="Sylfaen"/>
+        <a:font script="Armn" typeface="Arial"/>
+        <a:font script="Bugi" typeface="Leelawadee UI"/>
+        <a:font script="Bopo" typeface="Microsoft JhengHei"/>
+        <a:font script="Java" typeface="Javanese Text"/>
+        <a:font script="Lisu" typeface="Segoe UI"/>
+        <a:font script="Mymr" typeface="Myanmar Text"/>
+        <a:font script="Nkoo" typeface="Ebrima"/>
+        <a:font script="Olck" typeface="Nirmala UI"/>
+        <a:font script="Osma" typeface="Ebrima"/>
+        <a:font script="Phag" typeface="Phagspa"/>
+        <a:font script="Syrn" typeface="Estrangelo Edessa"/>
+        <a:font script="Syrj" typeface="Estrangelo Edessa"/>
+        <a:font script="Syre" typeface="Estrangelo Edessa"/>
+        <a:font script="Sora" typeface="Nirmala UI"/>
+        <a:font script="Tale" typeface="Microsoft Tai Le"/>
+        <a:font script="Talu" typeface="Microsoft New Tai Lue"/>
+        <a:font script="Tfng" typeface="Ebrima"/>
+      </a:majorFont>
+      <a:minorFont>
+        <a:latin typeface="Calibri" panose="020F0502020204030204"/>
+        <a:ea typeface=""/>
+        <a:cs typeface=""/>
+        <a:font script="Jpan" typeface="游ゴシック"/>
+        <a:font script="Hang" typeface="맑은 고딕"/>
+        <a:font script="Hans" typeface="等线"/>
+        <a:font script="Hant" typeface="新細明體"/>
+        <a:font script="Arab" typeface="Arial"/>
+        <a:font script="Hebr" typeface="Arial"/>
+        <a:font script="Thai" typeface="Cordia New"/>
+        <a:font script="Ethi" typeface="Nyala"/>
+        <a:font script="Beng" typeface="Vrinda"/>
+        <a:font script="Gujr" typeface="Shruti"/>
+        <a:font script="Khmr" typeface="DaunPenh"/>
+        <a:font script="Knda" typeface="Tunga"/>
+        <a:font script="Guru" typeface="Raavi"/>
+        <a:font script="Cans" typeface="Euphemia"/>
+        <a:font script="Cher" typeface="Plantagenet Cherokee"/>
+        <a:font script="Yiii" typeface="Microsoft Yi Baiti"/>
+        <a:font script="Tibt" typeface="Microsoft Himalaya"/>
+        <a:font script="Thaa" typeface="MV Boli"/>
+        <a:font script="Deva" typeface="Mangal"/>
+        <a:font script="Telu" typeface="Gautami"/>
+        <a:font script="Taml" typeface="Latha"/>
+        <a:font script="Syrc" typeface="Estrangelo Edessa"/>
+        <a:font script="Orya" typeface="Kalinga"/>
+        <a:font script="Mlym" typeface="Kartika"/>
+        <a:font script="Laoo" typeface="DokChampa"/>
+        <a:font script="Sinh" typeface="Iskoola Pota"/>
+        <a:font script="Mong" typeface="Mongolian Baiti"/>
+        <a:font script="Viet" typeface="Arial"/>
+        <a:font script="Uigh" typeface="Microsoft Uighur"/>
+        <a:font script="Geor" typeface="Sylfaen"/>
+        <a:font script="Armn" typeface="Arial"/>
+        <a:font script="Bugi" typeface="Leelawadee UI"/>
+        <a:font script="Bopo" typeface="Microsoft JhengHei"/>
+        <a:font script="Java" typeface="Javanese Text"/>
+        <a:font script="Lisu" typeface="Segoe UI"/>
+        <a:font script="Mymr" typeface="Myanmar Text"/>
+        <a:font script="Nkoo" typeface="Ebrima"/>
+        <a:font script="Olck" typeface="Nirmala UI"/>
+        <a:font script="Osma" typeface="Ebrima"/>
+        <a:font script="Phag" typeface="Phagspa"/>
+        <a:font script="Syrn" typeface="Estrangelo Edessa"/>
+        <a:font script="Syrj" typeface="Estrangelo Edessa"/>
+        <a:font script="Syre" typeface="Estrangelo Edessa"/>
+        <a:font script="Sora" typeface="Nirmala UI"/>
+        <a:font script="Tale" typeface="Microsoft Tai Le"/>
+        <a:font script="Talu" typeface="Microsoft New Tai Lue"/>
+        <a:font script="Tfng" typeface="Ebrima"/>
+      </a:minorFont>
+    </a:fontScheme>
+    <a:fmtScheme name="Office">
+      <a:fillStyleLst>
+        <a:solidFill>
+          <a:schemeClr val="phClr"/>
+        </a:solidFill>
+        <a:gradFill rotWithShape="1">
+          <a:gsLst>
+            <a:gs pos="0">
+              <a:schemeClr val="phClr">
+                <a:lumMod val="110000"/>
+                <a:satMod val="105000"/>
+                <a:tint val="67000"/>
+              </a:schemeClr>
+            </a:gs>
+            <a:gs pos="50000">
+              <a:schemeClr val="phClr">
+                <a:lumMod val="105000"/>
+                <a:satMod val="103000"/>
+                <a:tint val="73000"/>
+              </a:schemeClr>
+            </a:gs>
+            <a:gs pos="100000">
+              <a:schemeClr val="phClr">
+                <a:lumMod val="105000"/>
+                <a:satMod val="109000"/>
+                <a:tint val="81000"/>
+              </a:schemeClr>
+            </a:gs>
+          </a:gsLst>
+          <a:lin ang="5400000" scaled="0"/>
+        </a:gradFill>
+        <a:gradFill rotWithShape="1">
+          <a:gsLst>
+            <a:gs pos="0">
+              <a:schemeClr val="phClr">
+                <a:satMod val="103000"/>
+                <a:lumMod val="102000"/>
+                <a:tint val="94000"/>
+              </a:schemeClr>
+            </a:gs>
+            <a:gs pos="50000">
+              <a:schemeClr val="phClr">
+                <a:satMod val="110000"/>
+                <a:lumMod val="100000"/>
+                <a:shade val="100000"/>
+              </a:schemeClr>
+            </a:gs>
+            <a:gs pos="100000">
+              <a:schemeClr val="phClr">
+                <a:lumMod val="99000"/>
+                <a:satMod val="120000"/>
+                <a:shade val="78000"/>
+              </a:schemeClr>
+            </a:gs>
+          </a:gsLst>
+          <a:lin ang="5400000" scaled="0"/>
+        </a:gradFill>
+      </a:fillStyleLst>
+      <a:lnStyleLst>
+        <a:ln w="6350" cap="flat" cmpd="sng" algn="ctr">
+          <a:solidFill>
+            <a:schemeClr val="phClr"/>
+          </a:solidFill>
+          <a:prstDash val="solid"/>
+          <a:miter lim="800000"/>
+        </a:ln>
+        <a:ln w="12700" cap="flat" cmpd="sng" algn="ctr">
+          <a:solidFill>
+            <a:schemeClr val="phClr"/>
+          </a:solidFill>
+          <a:prstDash val="solid"/>
+          <a:miter lim="800000"/>
+        </a:ln>
+        <a:ln w="19050" cap="flat" cmpd="sng" algn="ctr">
+          <a:solidFill>
+            <a:schemeClr val="phClr"/>
+          </a:solidFill>
+          <a:prstDash val="solid"/>
+          <a:miter lim="800000"/>
+        </a:ln>
+      </a:lnStyleLst>
+      <a:effectStyleLst>
+        <a:effectStyle>
+          <a:effectLst/>
+        </a:effectStyle>
+        <a:effectStyle>
+          <a:effectLst/>
+        </a:effectStyle>
+        <a:effectStyle>
+          <a:effectLst>
+            <a:outerShdw blurRad="57150" dist="19050" dir="5400000" algn="ctr" rotWithShape="0">
+              <a:srgbClr val="000000">
+                <a:alpha val="63000"/>
+              </a:srgbClr>
+            </a:outerShdw>
+          </a:effectLst>
+        </a:effectStyle>
+      </a:effectStyleLst>
+      <a:bgFillStyleLst>
+        <a:solidFill>
+          <a:schemeClr val="phClr"/>
+        </a:solidFill>
+        <a:solidFill>
+          <a:schemeClr val="phClr">
+            <a:tint val="95000"/>
+            <a:satMod val="170000"/>
+          </a:schemeClr>
+        </a:solidFill>
+        <a:gradFill rotWithShape="1">
+          <a:gsLst>
+            <a:gs pos="0">
+              <a:schemeClr val="phClr">
+                <a:tint val="93000"/>
+                <a:satMod val="150000"/>
+                <a:shade val="98000"/>
+                <a:lumMod val="102000"/>
+              </a:schemeClr>
+            </a:gs>
+            <a:gs pos="50000">
+              <a:schemeClr val="phClr">
+                <a:tint val="98000"/>
+                <a:satMod val="130000"/>
+                <a:shade val="90000"/>
+                <a:lumMod val="103000"/>
+              </a:schemeClr>
+            </a:gs>
+            <a:gs pos="100000">
+              <a:schemeClr val="phClr">
+                <a:shade val="63000"/>
+                <a:satMod val="120000"/>
+              </a:schemeClr>
+            </a:gs>
+          </a:gsLst>
+          <a:lin ang="5400000" scaled="0"/>
+        </a:gradFill>
+      </a:bgFillStyleLst>
+    </a:fmtScheme>
+  </a:themeElements>
+  <a:objectDefaults/>
+  <a:extraClrSchemeLst/>
+  <a:extLst>
+    <a:ext uri="{05A4C25C-085E-4340-85A3-A5531E510DB2}">
+      <thm15:themeFamily xmlns:thm15="http://schemas.microsoft.com/office/thememl/2012/main" name="Office Theme" id="{62F939B6-93AF-4DB8-9C6B-D6C7DFDC589F}" vid="{4A3C46E8-61CC-4603-A589-7422A47A8E4A}"/>
+    </a:ext>
+  </a:extLst>
+</a:theme>
 </file>
</xml_diff>

<commit_message>
improving the title slide
</commit_message>
<xml_diff>
--- a/_extensions/presentation-gouv/ressources/template_presentation.pptx
+++ b/_extensions/presentation-gouv/ressources/template_presentation.pptx
@@ -9,8 +9,8 @@
   </p:notesMasterIdLst>
   <p:sldIdLst>
     <p:sldId id="256" r:id="rId2"/>
-    <p:sldId id="257" r:id="rId3"/>
-    <p:sldId id="258" r:id="rId4"/>
+    <p:sldId id="258" r:id="rId3"/>
+    <p:sldId id="257" r:id="rId4"/>
     <p:sldId id="259" r:id="rId5"/>
   </p:sldIdLst>
   <p:sldSz cx="9144000" cy="5143500" type="screen16x9"/>
@@ -645,7 +645,7 @@
             <a:spLocks noGrp="1"/>
           </p:cNvSpPr>
           <p:nvPr>
-            <p:ph type="subTitle" idx="1"/>
+            <p:ph type="subTitle" idx="1" hasCustomPrompt="1"/>
           </p:nvPr>
         </p:nvSpPr>
         <p:spPr>
@@ -655,7 +655,7 @@
           </a:xfrm>
         </p:spPr>
         <p:txBody>
-          <a:bodyPr/>
+          <a:bodyPr lIns="90000" tIns="46800" rIns="90000" bIns="46800" anchor="ctr" anchorCtr="0"/>
           <a:lstStyle>
             <a:lvl1pPr marL="0" indent="0" algn="l">
               <a:buNone/>
@@ -750,7 +750,7 @@
           </a:lstStyle>
           <a:p>
             <a:r>
-              <a:rPr lang="en-US"/>
+              <a:rPr lang="en-US" dirty="0"/>
               <a:t>Click to edit Master subtitle style</a:t>
             </a:r>
           </a:p>
@@ -1884,7 +1884,7 @@
 
 <file path=ppt/slideLayouts/slideLayout3.xml><?xml version="1.0" encoding="utf-8"?>
 <p:sldLayout xmlns:a="http://schemas.openxmlformats.org/drawingml/2006/main" xmlns:r="http://schemas.openxmlformats.org/officeDocument/2006/relationships" xmlns:p="http://schemas.openxmlformats.org/presentationml/2006/main" preserve="1" userDrawn="1">
-  <p:cSld name="2_Title Slide">
+  <p:cSld name="Section Header">
     <p:spTree>
       <p:nvGrpSpPr>
         <p:cNvPr id="1" name=""/>
@@ -2608,7 +2608,7 @@
 
 <file path=ppt/slideLayouts/slideLayout6.xml><?xml version="1.0" encoding="utf-8"?>
 <p:sldLayout xmlns:a="http://schemas.openxmlformats.org/drawingml/2006/main" xmlns:r="http://schemas.openxmlformats.org/officeDocument/2006/relationships" xmlns:p="http://schemas.openxmlformats.org/presentationml/2006/main" type="secHead" preserve="1">
-  <p:cSld name="Section Header">
+  <p:cSld name="Section Header Bis">
     <p:spTree>
       <p:nvGrpSpPr>
         <p:cNvPr id="1" name=""/>
@@ -4166,35 +4166,6 @@
       </p:sp>
       <p:sp>
         <p:nvSpPr>
-          <p:cNvPr id="3" name="Subtitle 2"/>
-          <p:cNvSpPr>
-            <a:spLocks noGrp="1"/>
-          </p:cNvSpPr>
-          <p:nvPr>
-            <p:ph type="subTitle" idx="1"/>
-          </p:nvPr>
-        </p:nvSpPr>
-        <p:spPr/>
-        <p:txBody>
-          <a:bodyPr/>
-          <a:lstStyle/>
-          <a:p>
-            <a:pPr marL="0" lvl="0" indent="0">
-              <a:buNone/>
-            </a:pPr>
-            <a:r>
-              <a:t>Sous-titre de la présentation</a:t>
-            </a:r>
-            <a:br/>
-            <a:br/>
-            <a:r>
-              <a:t>Auteur de la présentation</a:t>
-            </a:r>
-          </a:p>
-        </p:txBody>
-      </p:sp>
-      <p:sp>
-        <p:nvSpPr>
           <p:cNvPr id="5" name="Espace réservé de la date 4">
             <a:extLst>
               <a:ext uri="{FF2B5EF4-FFF2-40B4-BE49-F238E27FC236}">
@@ -4224,6 +4195,37 @@
       </p:sp>
       <p:sp>
         <p:nvSpPr>
+          <p:cNvPr id="3" name="Subtitle 2"/>
+          <p:cNvSpPr>
+            <a:spLocks noGrp="1"/>
+          </p:cNvSpPr>
+          <p:nvPr>
+            <p:ph type="subTitle" idx="1"/>
+          </p:nvPr>
+        </p:nvSpPr>
+        <p:spPr/>
+        <p:txBody>
+          <a:bodyPr>
+            <a:normAutofit fontScale="62500" lnSpcReduction="20000"/>
+          </a:bodyPr>
+          <a:lstStyle/>
+          <a:p>
+            <a:pPr marL="0" lvl="0" indent="0">
+              <a:buNone/>
+            </a:pPr>
+            <a:r>
+              <a:t>Sous-titre de la présentation</a:t>
+            </a:r>
+            <a:br/>
+            <a:br/>
+            <a:r>
+              <a:t>Auteur de la présentation</a:t>
+            </a:r>
+          </a:p>
+        </p:txBody>
+      </p:sp>
+      <p:sp>
+        <p:nvSpPr>
           <p:cNvPr id="7" name="Espace réservé du numéro de diapositive 6">
             <a:extLst>
               <a:ext uri="{FF2B5EF4-FFF2-40B4-BE49-F238E27FC236}">
@@ -4235,10 +4237,15 @@
             <a:spLocks noGrp="1"/>
           </p:cNvSpPr>
           <p:nvPr>
-            <p:ph type="sldNum" sz="quarter" idx="12"/>
-          </p:nvPr>
-        </p:nvSpPr>
-        <p:spPr/>
+            <p:ph type="sldNum" sz="quarter" idx="4294967295"/>
+          </p:nvPr>
+        </p:nvSpPr>
+        <p:spPr>
+          <a:xfrm>
+            <a:off x="7793038" y="4910138"/>
+            <a:ext cx="1350962" cy="234950"/>
+          </a:xfrm>
+        </p:spPr>
         <p:txBody>
           <a:bodyPr/>
           <a:lstStyle/>
@@ -4248,6 +4255,31 @@
               <a:t>1</a:t>
             </a:fld>
             <a:endParaRPr lang="en-US"/>
+          </a:p>
+        </p:txBody>
+      </p:sp>
+      <p:sp>
+        <p:nvSpPr>
+          <p:cNvPr id="4" name="Espace réservé du pied de page 3">
+            <a:extLst>
+              <a:ext uri="{FF2B5EF4-FFF2-40B4-BE49-F238E27FC236}">
+                <a16:creationId xmlns:a16="http://schemas.microsoft.com/office/drawing/2014/main" id="{D7E98DB5-7D18-095E-90EA-E593D78DC196}"/>
+              </a:ext>
+            </a:extLst>
+          </p:cNvPr>
+          <p:cNvSpPr>
+            <a:spLocks noGrp="1"/>
+          </p:cNvSpPr>
+          <p:nvPr>
+            <p:ph type="ftr" sz="quarter" idx="11"/>
+          </p:nvPr>
+        </p:nvSpPr>
+        <p:spPr/>
+        <p:txBody>
+          <a:bodyPr/>
+          <a:lstStyle/>
+          <a:p>
+            <a:endParaRPr lang="fr-FR" dirty="0"/>
           </a:p>
         </p:txBody>
       </p:sp>
@@ -4278,80 +4310,10 @@
       </p:grpSpPr>
       <p:sp>
         <p:nvSpPr>
-          <p:cNvPr id="2" name="Title 1"/>
-          <p:cNvSpPr>
-            <a:spLocks noGrp="1"/>
-          </p:cNvSpPr>
-          <p:nvPr>
-            <p:ph type="title"/>
-          </p:nvPr>
-        </p:nvSpPr>
-        <p:spPr/>
-        <p:txBody>
-          <a:bodyPr/>
-          <a:lstStyle/>
-          <a:p>
-            <a:pPr marL="0" lvl="0" indent="0">
-              <a:buNone/>
-            </a:pPr>
-            <a:r>
-              <a:t>Titre</a:t>
-            </a:r>
-          </a:p>
-        </p:txBody>
-      </p:sp>
-      <p:sp>
-        <p:nvSpPr>
-          <p:cNvPr id="3" name="Content Placeholder 2"/>
-          <p:cNvSpPr>
-            <a:spLocks noGrp="1"/>
-          </p:cNvSpPr>
-          <p:nvPr>
-            <p:ph idx="1"/>
-          </p:nvPr>
-        </p:nvSpPr>
-        <p:spPr/>
-        <p:txBody>
-          <a:bodyPr/>
-          <a:lstStyle/>
-          <a:p>
-            <a:pPr lvl="0"/>
-            <a:r>
-              <a:t>Texte de niveau 1</a:t>
-            </a:r>
-          </a:p>
-          <a:p>
-            <a:pPr lvl="1"/>
-            <a:r>
-              <a:t>Texte de niveau 2</a:t>
-            </a:r>
-          </a:p>
-          <a:p>
-            <a:pPr lvl="2"/>
-            <a:r>
-              <a:t>Texte de niveau 3</a:t>
-            </a:r>
-          </a:p>
-          <a:p>
-            <a:pPr lvl="3"/>
-            <a:r>
-              <a:t>Texte de niveau 4</a:t>
-            </a:r>
-          </a:p>
-          <a:p>
-            <a:pPr lvl="4"/>
-            <a:r>
-              <a:t>Texte de niveau 5</a:t>
-            </a:r>
-          </a:p>
-        </p:txBody>
-      </p:sp>
-      <p:sp>
-        <p:nvSpPr>
-          <p:cNvPr id="4" name="Espace réservé du pied de page 3">
+          <p:cNvPr id="5" name="Espace réservé du pied de page 4">
             <a:extLst>
               <a:ext uri="{FF2B5EF4-FFF2-40B4-BE49-F238E27FC236}">
-                <a16:creationId xmlns:a16="http://schemas.microsoft.com/office/drawing/2014/main" id="{B9E85F68-48C4-DD97-6ED7-AC66FDF13AAD}"/>
+                <a16:creationId xmlns:a16="http://schemas.microsoft.com/office/drawing/2014/main" id="{13AB9E43-2E17-9D77-6B1F-42A43D0C3D7E}"/>
               </a:ext>
             </a:extLst>
           </p:cNvPr>
@@ -4373,10 +4335,10 @@
       </p:sp>
       <p:sp>
         <p:nvSpPr>
-          <p:cNvPr id="5" name="Espace réservé de la date 4">
+          <p:cNvPr id="7" name="Titre 6">
             <a:extLst>
               <a:ext uri="{FF2B5EF4-FFF2-40B4-BE49-F238E27FC236}">
-                <a16:creationId xmlns:a16="http://schemas.microsoft.com/office/drawing/2014/main" id="{4D5BDFD5-5C26-52A1-DAF0-C131A80E4913}"/>
+                <a16:creationId xmlns:a16="http://schemas.microsoft.com/office/drawing/2014/main" id="{F9F2B6D6-6519-C5CE-F5FD-E245537B1867}"/>
               </a:ext>
             </a:extLst>
           </p:cNvPr>
@@ -4384,52 +4346,24 @@
             <a:spLocks noGrp="1"/>
           </p:cNvSpPr>
           <p:nvPr>
-            <p:ph type="dt" sz="half" idx="10"/>
-          </p:nvPr>
-        </p:nvSpPr>
-        <p:spPr/>
-        <p:txBody>
-          <a:bodyPr/>
-          <a:lstStyle/>
-          <a:p>
-            <a:r>
-              <a:rPr lang="fr-FR"/>
-              <a:t>03/11/2022</a:t>
-            </a:r>
-            <a:endParaRPr lang="en-US"/>
-          </a:p>
-        </p:txBody>
-      </p:sp>
-      <p:sp>
-        <p:nvSpPr>
-          <p:cNvPr id="6" name="Espace réservé du numéro de diapositive 5">
-            <a:extLst>
-              <a:ext uri="{FF2B5EF4-FFF2-40B4-BE49-F238E27FC236}">
-                <a16:creationId xmlns:a16="http://schemas.microsoft.com/office/drawing/2014/main" id="{FD8235FA-B1EB-554A-49BC-0289DC5D1EC0}"/>
-              </a:ext>
-            </a:extLst>
-          </p:cNvPr>
-          <p:cNvSpPr>
-            <a:spLocks noGrp="1"/>
-          </p:cNvSpPr>
-          <p:nvPr>
-            <p:ph type="sldNum" sz="quarter" idx="12"/>
-          </p:nvPr>
-        </p:nvSpPr>
-        <p:spPr/>
-        <p:txBody>
-          <a:bodyPr/>
-          <a:lstStyle/>
-          <a:p>
-            <a:fld id="{C5EF2332-01BF-834F-8236-50238282D533}" type="slidenum">
-              <a:rPr lang="en-US" smtClean="0"/>
-              <a:t>2</a:t>
-            </a:fld>
-            <a:endParaRPr lang="en-US"/>
+            <p:ph type="ctrTitle"/>
+          </p:nvPr>
+        </p:nvSpPr>
+        <p:spPr/>
+        <p:txBody>
+          <a:bodyPr/>
+          <a:lstStyle/>
+          <a:p>
+            <a:endParaRPr lang="fr-FR"/>
           </a:p>
         </p:txBody>
       </p:sp>
     </p:spTree>
+    <p:extLst>
+      <p:ext uri="{BB962C8B-B14F-4D97-AF65-F5344CB8AC3E}">
+        <p14:creationId xmlns:p14="http://schemas.microsoft.com/office/powerpoint/2010/main" val="2176111243"/>
+      </p:ext>
+    </p:extLst>
   </p:cSld>
   <p:clrMapOvr>
     <a:masterClrMapping/>
@@ -4526,10 +4460,39 @@
       </p:sp>
       <p:sp>
         <p:nvSpPr>
+          <p:cNvPr id="5" name="Espace réservé de la date 4">
+            <a:extLst>
+              <a:ext uri="{FF2B5EF4-FFF2-40B4-BE49-F238E27FC236}">
+                <a16:creationId xmlns:a16="http://schemas.microsoft.com/office/drawing/2014/main" id="{4D5BDFD5-5C26-52A1-DAF0-C131A80E4913}"/>
+              </a:ext>
+            </a:extLst>
+          </p:cNvPr>
+          <p:cNvSpPr>
+            <a:spLocks noGrp="1"/>
+          </p:cNvSpPr>
+          <p:nvPr>
+            <p:ph type="dt" sz="half" idx="10"/>
+          </p:nvPr>
+        </p:nvSpPr>
+        <p:spPr/>
+        <p:txBody>
+          <a:bodyPr/>
+          <a:lstStyle/>
+          <a:p>
+            <a:r>
+              <a:rPr lang="fr-FR"/>
+              <a:t>03/11/2022</a:t>
+            </a:r>
+            <a:endParaRPr lang="en-US"/>
+          </a:p>
+        </p:txBody>
+      </p:sp>
+      <p:sp>
+        <p:nvSpPr>
           <p:cNvPr id="4" name="Espace réservé du pied de page 3">
             <a:extLst>
               <a:ext uri="{FF2B5EF4-FFF2-40B4-BE49-F238E27FC236}">
-                <a16:creationId xmlns:a16="http://schemas.microsoft.com/office/drawing/2014/main" id="{3D7392B6-E6BA-6F46-949B-215EF499F3C6}"/>
+                <a16:creationId xmlns:a16="http://schemas.microsoft.com/office/drawing/2014/main" id="{B9E85F68-48C4-DD97-6ED7-AC66FDF13AAD}"/>
               </a:ext>
             </a:extLst>
           </p:cNvPr>
@@ -4551,39 +4514,10 @@
       </p:sp>
       <p:sp>
         <p:nvSpPr>
-          <p:cNvPr id="5" name="Espace réservé de la date 4">
-            <a:extLst>
-              <a:ext uri="{FF2B5EF4-FFF2-40B4-BE49-F238E27FC236}">
-                <a16:creationId xmlns:a16="http://schemas.microsoft.com/office/drawing/2014/main" id="{D7566213-30F7-F833-F58B-020BFF4377AE}"/>
-              </a:ext>
-            </a:extLst>
-          </p:cNvPr>
-          <p:cNvSpPr>
-            <a:spLocks noGrp="1"/>
-          </p:cNvSpPr>
-          <p:nvPr>
-            <p:ph type="dt" sz="half" idx="10"/>
-          </p:nvPr>
-        </p:nvSpPr>
-        <p:spPr/>
-        <p:txBody>
-          <a:bodyPr/>
-          <a:lstStyle/>
-          <a:p>
-            <a:r>
-              <a:rPr lang="fr-FR"/>
-              <a:t>03/11/2022</a:t>
-            </a:r>
-            <a:endParaRPr lang="en-US"/>
-          </a:p>
-        </p:txBody>
-      </p:sp>
-      <p:sp>
-        <p:nvSpPr>
           <p:cNvPr id="6" name="Espace réservé du numéro de diapositive 5">
             <a:extLst>
               <a:ext uri="{FF2B5EF4-FFF2-40B4-BE49-F238E27FC236}">
-                <a16:creationId xmlns:a16="http://schemas.microsoft.com/office/drawing/2014/main" id="{60564648-5FAF-A532-0757-1684769A779B}"/>
+                <a16:creationId xmlns:a16="http://schemas.microsoft.com/office/drawing/2014/main" id="{FD8235FA-B1EB-554A-49BC-0289DC5D1EC0}"/>
               </a:ext>
             </a:extLst>
           </p:cNvPr>
@@ -4604,6 +4538,31 @@
               <a:t>3</a:t>
             </a:fld>
             <a:endParaRPr lang="en-US"/>
+          </a:p>
+        </p:txBody>
+      </p:sp>
+      <p:sp>
+        <p:nvSpPr>
+          <p:cNvPr id="7" name="Espace réservé du texte 6">
+            <a:extLst>
+              <a:ext uri="{FF2B5EF4-FFF2-40B4-BE49-F238E27FC236}">
+                <a16:creationId xmlns:a16="http://schemas.microsoft.com/office/drawing/2014/main" id="{FE7E41BF-DAC3-0173-F34C-2275E514738C}"/>
+              </a:ext>
+            </a:extLst>
+          </p:cNvPr>
+          <p:cNvSpPr>
+            <a:spLocks noGrp="1"/>
+          </p:cNvSpPr>
+          <p:nvPr>
+            <p:ph type="body" sz="quarter" idx="13"/>
+          </p:nvPr>
+        </p:nvSpPr>
+        <p:spPr/>
+        <p:txBody>
+          <a:bodyPr/>
+          <a:lstStyle/>
+          <a:p>
+            <a:endParaRPr lang="fr-FR"/>
           </a:p>
         </p:txBody>
       </p:sp>
@@ -4634,92 +4593,10 @@
       </p:grpSpPr>
       <p:sp>
         <p:nvSpPr>
-          <p:cNvPr id="2" name="Title 1"/>
-          <p:cNvSpPr>
-            <a:spLocks noGrp="1"/>
-          </p:cNvSpPr>
-          <p:nvPr>
-            <p:ph type="title"/>
-          </p:nvPr>
-        </p:nvSpPr>
-        <p:spPr/>
-        <p:txBody>
-          <a:bodyPr/>
-          <a:lstStyle/>
-          <a:p>
-            <a:pPr marL="0" lvl="0" indent="0">
-              <a:buNone/>
-            </a:pPr>
-            <a:r>
-              <a:t>Titre</a:t>
-            </a:r>
-          </a:p>
-        </p:txBody>
-      </p:sp>
-      <p:sp>
-        <p:nvSpPr>
-          <p:cNvPr id="3" name="Content Placeholder 2"/>
-          <p:cNvSpPr>
-            <a:spLocks noGrp="1"/>
-          </p:cNvSpPr>
-          <p:nvPr>
-            <p:ph idx="1"/>
-          </p:nvPr>
-        </p:nvSpPr>
-        <p:spPr/>
-        <p:txBody>
-          <a:bodyPr/>
-          <a:lstStyle/>
-          <a:p>
-            <a:pPr marL="0" lvl="0" indent="0">
-              <a:spcBef>
-                <a:spcPts val="3000"/>
-              </a:spcBef>
-              <a:buNone/>
-            </a:pPr>
-            <a:r>
-              <a:rPr b="1"/>
-              <a:t>Titre</a:t>
-            </a:r>
-          </a:p>
-          <a:p>
-            <a:pPr lvl="0"/>
-            <a:r>
-              <a:t>Texte de niveau 1</a:t>
-            </a:r>
-          </a:p>
-          <a:p>
-            <a:pPr lvl="1"/>
-            <a:r>
-              <a:t>Texte de niveau 2</a:t>
-            </a:r>
-          </a:p>
-          <a:p>
-            <a:pPr lvl="2"/>
-            <a:r>
-              <a:t>Texte de niveau 3</a:t>
-            </a:r>
-          </a:p>
-          <a:p>
-            <a:pPr lvl="3"/>
-            <a:r>
-              <a:t>Texte de niveau 4</a:t>
-            </a:r>
-          </a:p>
-          <a:p>
-            <a:pPr lvl="4"/>
-            <a:r>
-              <a:t>Texte de niveau 5</a:t>
-            </a:r>
-          </a:p>
-        </p:txBody>
-      </p:sp>
-      <p:sp>
-        <p:nvSpPr>
-          <p:cNvPr id="4" name="Espace réservé du pied de page 3">
+          <p:cNvPr id="8" name="Titre 7">
             <a:extLst>
               <a:ext uri="{FF2B5EF4-FFF2-40B4-BE49-F238E27FC236}">
-                <a16:creationId xmlns:a16="http://schemas.microsoft.com/office/drawing/2014/main" id="{50A22841-CFC8-54DE-43FA-7DC589DC43B5}"/>
+                <a16:creationId xmlns:a16="http://schemas.microsoft.com/office/drawing/2014/main" id="{2BD28108-1C8D-A295-F397-F15A4F6055C5}"/>
               </a:ext>
             </a:extLst>
           </p:cNvPr>
@@ -4727,24 +4604,24 @@
             <a:spLocks noGrp="1"/>
           </p:cNvSpPr>
           <p:nvPr>
-            <p:ph type="ftr" sz="quarter" idx="11"/>
-          </p:nvPr>
-        </p:nvSpPr>
-        <p:spPr/>
-        <p:txBody>
-          <a:bodyPr/>
-          <a:lstStyle/>
-          <a:p>
-            <a:endParaRPr lang="en-US"/>
-          </a:p>
-        </p:txBody>
-      </p:sp>
-      <p:sp>
-        <p:nvSpPr>
-          <p:cNvPr id="5" name="Espace réservé de la date 4">
+            <p:ph type="title"/>
+          </p:nvPr>
+        </p:nvSpPr>
+        <p:spPr/>
+        <p:txBody>
+          <a:bodyPr/>
+          <a:lstStyle/>
+          <a:p>
+            <a:endParaRPr lang="fr-FR"/>
+          </a:p>
+        </p:txBody>
+      </p:sp>
+      <p:sp>
+        <p:nvSpPr>
+          <p:cNvPr id="9" name="Espace réservé du contenu 8">
             <a:extLst>
               <a:ext uri="{FF2B5EF4-FFF2-40B4-BE49-F238E27FC236}">
-                <a16:creationId xmlns:a16="http://schemas.microsoft.com/office/drawing/2014/main" id="{EBB5D1E0-155C-1EDD-3F43-494D20C73829}"/>
+                <a16:creationId xmlns:a16="http://schemas.microsoft.com/office/drawing/2014/main" id="{64B82960-25B7-607A-1761-FF159BA7FF30}"/>
               </a:ext>
             </a:extLst>
           </p:cNvPr>
@@ -4752,6 +4629,31 @@
             <a:spLocks noGrp="1"/>
           </p:cNvSpPr>
           <p:nvPr>
+            <p:ph idx="1"/>
+          </p:nvPr>
+        </p:nvSpPr>
+        <p:spPr/>
+        <p:txBody>
+          <a:bodyPr/>
+          <a:lstStyle/>
+          <a:p>
+            <a:endParaRPr lang="fr-FR"/>
+          </a:p>
+        </p:txBody>
+      </p:sp>
+      <p:sp>
+        <p:nvSpPr>
+          <p:cNvPr id="4" name="Espace réservé de la date 3">
+            <a:extLst>
+              <a:ext uri="{FF2B5EF4-FFF2-40B4-BE49-F238E27FC236}">
+                <a16:creationId xmlns:a16="http://schemas.microsoft.com/office/drawing/2014/main" id="{D8809047-00FF-4C8C-72DB-54B1008DB87E}"/>
+              </a:ext>
+            </a:extLst>
+          </p:cNvPr>
+          <p:cNvSpPr>
+            <a:spLocks noGrp="1"/>
+          </p:cNvSpPr>
+          <p:nvPr>
             <p:ph type="dt" sz="half" idx="10"/>
           </p:nvPr>
         </p:nvSpPr>
@@ -4764,6 +4666,31 @@
               <a:rPr lang="fr-FR"/>
               <a:t>03/11/2022</a:t>
             </a:r>
+            <a:endParaRPr lang="en-US"/>
+          </a:p>
+        </p:txBody>
+      </p:sp>
+      <p:sp>
+        <p:nvSpPr>
+          <p:cNvPr id="5" name="Espace réservé du pied de page 4">
+            <a:extLst>
+              <a:ext uri="{FF2B5EF4-FFF2-40B4-BE49-F238E27FC236}">
+                <a16:creationId xmlns:a16="http://schemas.microsoft.com/office/drawing/2014/main" id="{79265970-6590-6182-D026-379BC14E8889}"/>
+              </a:ext>
+            </a:extLst>
+          </p:cNvPr>
+          <p:cNvSpPr>
+            <a:spLocks noGrp="1"/>
+          </p:cNvSpPr>
+          <p:nvPr>
+            <p:ph type="ftr" sz="quarter" idx="11"/>
+          </p:nvPr>
+        </p:nvSpPr>
+        <p:spPr/>
+        <p:txBody>
+          <a:bodyPr/>
+          <a:lstStyle/>
+          <a:p>
             <a:endParaRPr lang="en-US"/>
           </a:p>
         </p:txBody>
@@ -4773,7 +4700,7 @@
           <p:cNvPr id="6" name="Espace réservé du numéro de diapositive 5">
             <a:extLst>
               <a:ext uri="{FF2B5EF4-FFF2-40B4-BE49-F238E27FC236}">
-                <a16:creationId xmlns:a16="http://schemas.microsoft.com/office/drawing/2014/main" id="{3DD3B008-85B0-92A5-7D31-BEAFABAF3D8D}"/>
+                <a16:creationId xmlns:a16="http://schemas.microsoft.com/office/drawing/2014/main" id="{79BA43BA-0C85-685F-5603-91E2A3314A18}"/>
               </a:ext>
             </a:extLst>
           </p:cNvPr>
@@ -4797,7 +4724,62 @@
           </a:p>
         </p:txBody>
       </p:sp>
+      <p:sp>
+        <p:nvSpPr>
+          <p:cNvPr id="10" name="Espace réservé du texte 9">
+            <a:extLst>
+              <a:ext uri="{FF2B5EF4-FFF2-40B4-BE49-F238E27FC236}">
+                <a16:creationId xmlns:a16="http://schemas.microsoft.com/office/drawing/2014/main" id="{2A028A8B-A075-AF05-3F05-E174753929B5}"/>
+              </a:ext>
+            </a:extLst>
+          </p:cNvPr>
+          <p:cNvSpPr>
+            <a:spLocks noGrp="1"/>
+          </p:cNvSpPr>
+          <p:nvPr>
+            <p:ph type="body" sz="quarter" idx="13"/>
+          </p:nvPr>
+        </p:nvSpPr>
+        <p:spPr/>
+        <p:txBody>
+          <a:bodyPr/>
+          <a:lstStyle/>
+          <a:p>
+            <a:endParaRPr lang="fr-FR"/>
+          </a:p>
+        </p:txBody>
+      </p:sp>
+      <p:sp>
+        <p:nvSpPr>
+          <p:cNvPr id="11" name="Espace réservé du contenu 10">
+            <a:extLst>
+              <a:ext uri="{FF2B5EF4-FFF2-40B4-BE49-F238E27FC236}">
+                <a16:creationId xmlns:a16="http://schemas.microsoft.com/office/drawing/2014/main" id="{45A67405-6AA1-6FF8-6C20-E69C27973CFB}"/>
+              </a:ext>
+            </a:extLst>
+          </p:cNvPr>
+          <p:cNvSpPr>
+            <a:spLocks noGrp="1"/>
+          </p:cNvSpPr>
+          <p:nvPr>
+            <p:ph idx="14"/>
+          </p:nvPr>
+        </p:nvSpPr>
+        <p:spPr/>
+        <p:txBody>
+          <a:bodyPr/>
+          <a:lstStyle/>
+          <a:p>
+            <a:endParaRPr lang="fr-FR"/>
+          </a:p>
+        </p:txBody>
+      </p:sp>
     </p:spTree>
+    <p:extLst>
+      <p:ext uri="{BB962C8B-B14F-4D97-AF65-F5344CB8AC3E}">
+        <p14:creationId xmlns:p14="http://schemas.microsoft.com/office/powerpoint/2010/main" val="3060975926"/>
+      </p:ext>
+    </p:extLst>
   </p:cSld>
   <p:clrMapOvr>
     <a:masterClrMapping/>

</xml_diff>

<commit_message>
changing second level font
</commit_message>
<xml_diff>
--- a/_extensions/presentation-gouv/ressources/template_presentation.pptx
+++ b/_extensions/presentation-gouv/ressources/template_presentation.pptx
@@ -650,7 +650,7 @@
         </p:nvSpPr>
         <p:spPr>
           <a:xfrm>
-            <a:off x="2411876" y="2721600"/>
+            <a:off x="2411876" y="2776464"/>
             <a:ext cx="5832000" cy="446400"/>
           </a:xfrm>
         </p:spPr>
@@ -3911,7 +3911,7 @@
         <a:buChar char="•"/>
         <a:defRPr lang="en-US" sz="1200" kern="1200" dirty="0">
           <a:solidFill>
-            <a:schemeClr val="tx1"/>
+            <a:srgbClr val="002060"/>
           </a:solidFill>
           <a:latin typeface="Marianne" charset="0"/>
           <a:ea typeface="+mn-ea"/>

</xml_diff>